<commit_message>
foxpath upgrade - predefined namespace 'docbook'.
</commit_message>
<xml_diff>
--- a/about/greenfox11.pptx
+++ b/about/greenfox11.pptx
@@ -5,10 +5,10 @@
     <p:sldMasterId id="2147483710" r:id="rId1"/>
   </p:sldMasterIdLst>
   <p:notesMasterIdLst>
-    <p:notesMasterId r:id="rId31"/>
+    <p:notesMasterId r:id="rId34"/>
   </p:notesMasterIdLst>
   <p:handoutMasterIdLst>
-    <p:handoutMasterId r:id="rId32"/>
+    <p:handoutMasterId r:id="rId35"/>
   </p:handoutMasterIdLst>
   <p:sldIdLst>
     <p:sldId id="925" r:id="rId2"/>
@@ -20,26 +20,29 @@
     <p:sldId id="1178" r:id="rId8"/>
     <p:sldId id="1196" r:id="rId9"/>
     <p:sldId id="1199" r:id="rId10"/>
-    <p:sldId id="1205" r:id="rId11"/>
-    <p:sldId id="1201" r:id="rId12"/>
-    <p:sldId id="1156" r:id="rId13"/>
-    <p:sldId id="1193" r:id="rId14"/>
-    <p:sldId id="1157" r:id="rId15"/>
-    <p:sldId id="1158" r:id="rId16"/>
-    <p:sldId id="1208" r:id="rId17"/>
-    <p:sldId id="1181" r:id="rId18"/>
-    <p:sldId id="1190" r:id="rId19"/>
-    <p:sldId id="1188" r:id="rId20"/>
-    <p:sldId id="1179" r:id="rId21"/>
-    <p:sldId id="1182" r:id="rId22"/>
-    <p:sldId id="1183" r:id="rId23"/>
-    <p:sldId id="1184" r:id="rId24"/>
-    <p:sldId id="1165" r:id="rId25"/>
-    <p:sldId id="1180" r:id="rId26"/>
-    <p:sldId id="1212" r:id="rId27"/>
-    <p:sldId id="1210" r:id="rId28"/>
-    <p:sldId id="1211" r:id="rId29"/>
-    <p:sldId id="1177" r:id="rId30"/>
+    <p:sldId id="1214" r:id="rId11"/>
+    <p:sldId id="1213" r:id="rId12"/>
+    <p:sldId id="1201" r:id="rId13"/>
+    <p:sldId id="1156" r:id="rId14"/>
+    <p:sldId id="1193" r:id="rId15"/>
+    <p:sldId id="1157" r:id="rId16"/>
+    <p:sldId id="1158" r:id="rId17"/>
+    <p:sldId id="1208" r:id="rId18"/>
+    <p:sldId id="1181" r:id="rId19"/>
+    <p:sldId id="1190" r:id="rId20"/>
+    <p:sldId id="1215" r:id="rId21"/>
+    <p:sldId id="1188" r:id="rId22"/>
+    <p:sldId id="1179" r:id="rId23"/>
+    <p:sldId id="1182" r:id="rId24"/>
+    <p:sldId id="1183" r:id="rId25"/>
+    <p:sldId id="1184" r:id="rId26"/>
+    <p:sldId id="1165" r:id="rId27"/>
+    <p:sldId id="1180" r:id="rId28"/>
+    <p:sldId id="1212" r:id="rId29"/>
+    <p:sldId id="1210" r:id="rId30"/>
+    <p:sldId id="1211" r:id="rId31"/>
+    <p:sldId id="1177" r:id="rId32"/>
+    <p:sldId id="1205" r:id="rId33"/>
   </p:sldIdLst>
   <p:sldSz cx="9144000" cy="6858000" type="screen4x3"/>
   <p:notesSz cx="6858000" cy="9945688"/>
@@ -1395,11 +1398,11 @@
           <a:p>
             <a:r>
               <a:rPr lang="de-DE" smtClean="0"/>
-              <a:t>The target declaration in the first row selects</a:t>
+              <a:t>Yo</a:t>
             </a:r>
             <a:r>
               <a:rPr lang="de-DE" baseline="0" smtClean="0"/>
-              <a:t> a child resource. In the second row, descendant resources are selected. In the third row, navigation into a sibling folder is followed by downward navigation. In the last two rows conditions are added, referring to the containing folder name and even file contents.</a:t>
+              <a:t>u may be tempted to think that shape nesting is only for describing the hierarchy of folders and files. But it can be used for describing other relationships, too: subsetting, and conditional occurrence. Subsetting: the nested file shape is only evaluated for each docbook file.</a:t>
             </a:r>
             <a:endParaRPr lang="de-DE"/>
           </a:p>
@@ -1437,7 +1440,7 @@
     </p:spTree>
     <p:extLst>
       <p:ext uri="{BB962C8B-B14F-4D97-AF65-F5344CB8AC3E}">
-        <p14:creationId xmlns:p14="http://schemas.microsoft.com/office/powerpoint/2010/main" val="4126180884"/>
+        <p14:creationId xmlns:p14="http://schemas.microsoft.com/office/powerpoint/2010/main" val="1959067395"/>
       </p:ext>
     </p:extLst>
   </p:cSld>
@@ -1493,23 +1496,11 @@
           <a:p>
             <a:r>
               <a:rPr lang="de-DE" smtClean="0"/>
-              <a:t>As you have seen, file contents</a:t>
+              <a:t>The nested file shape in turn contains a nested folder shape. The nested folder</a:t>
             </a:r>
             <a:r>
               <a:rPr lang="de-DE" baseline="0" smtClean="0"/>
-              <a:t> can be constrained </a:t>
-            </a:r>
-            <a:r>
-              <a:rPr lang="de-DE" baseline="0" smtClean="0"/>
-              <a:t>using </a:t>
-            </a:r>
-            <a:r>
-              <a:rPr lang="de-DE" smtClean="0"/>
-              <a:t>XPath expressions. Such constraints can</a:t>
-            </a:r>
-            <a:r>
-              <a:rPr lang="de-DE" baseline="0" smtClean="0"/>
-              <a:t> also be used for non-XML files: JSON files, CSV files, HTML files. This example shows how a mediatype annotation suffices to make a JSON file accessible to XPath.</a:t>
+              <a:t> shape describes a mandatory image folder. It is evaluated for each docbook with images – and only for them.</a:t>
             </a:r>
             <a:endParaRPr lang="de-DE"/>
           </a:p>
@@ -1547,7 +1538,7 @@
     </p:spTree>
     <p:extLst>
       <p:ext uri="{BB962C8B-B14F-4D97-AF65-F5344CB8AC3E}">
-        <p14:creationId xmlns:p14="http://schemas.microsoft.com/office/powerpoint/2010/main" val="1257983340"/>
+        <p14:creationId xmlns:p14="http://schemas.microsoft.com/office/powerpoint/2010/main" val="2645424178"/>
       </p:ext>
     </p:extLst>
   </p:cSld>
@@ -1603,19 +1594,19 @@
           <a:p>
             <a:r>
               <a:rPr lang="de-DE" smtClean="0"/>
-              <a:t>Having</a:t>
+              <a:t>As you have seen, file contents</a:t>
             </a:r>
             <a:r>
               <a:rPr lang="de-DE" baseline="0" smtClean="0"/>
-              <a:t> given some first impressions, I want to define key features of the greenfox language. Feature one: g</a:t>
+              <a:t> can be constrained using </a:t>
             </a:r>
             <a:r>
               <a:rPr lang="de-DE" smtClean="0"/>
-              <a:t>reenfox is based on the XDM data model. </a:t>
+              <a:t>XPath expressions. Such constraints can</a:t>
             </a:r>
             <a:r>
               <a:rPr lang="de-DE" baseline="0" smtClean="0"/>
-              <a:t>Every value describing or constraining a resource is an XDM value, which means it is a sequence of zero or more items, which may be atomic values, nodes, maps or arrays.</a:t>
+              <a:t> also be used for non-XML files: JSON files, CSV files, HTML files. This example shows how a mediatype annotation suffices to make a JSON file accessible to XPath.</a:t>
             </a:r>
             <a:endParaRPr lang="de-DE"/>
           </a:p>
@@ -1653,7 +1644,7 @@
     </p:spTree>
     <p:extLst>
       <p:ext uri="{BB962C8B-B14F-4D97-AF65-F5344CB8AC3E}">
-        <p14:creationId xmlns:p14="http://schemas.microsoft.com/office/powerpoint/2010/main" val="3549090886"/>
+        <p14:creationId xmlns:p14="http://schemas.microsoft.com/office/powerpoint/2010/main" val="1257983340"/>
       </p:ext>
     </p:extLst>
   </p:cSld>
@@ -1709,15 +1700,19 @@
           <a:p>
             <a:r>
               <a:rPr lang="de-DE" smtClean="0"/>
-              <a:t>Second key feature:</a:t>
+              <a:t>Having</a:t>
             </a:r>
             <a:r>
               <a:rPr lang="de-DE" baseline="0" smtClean="0"/>
-              <a:t> advanced navigation skills</a:t>
+              <a:t> given some first impressions, I want to define key features of the greenfox language. Feature one: g</a:t>
+            </a:r>
+            <a:r>
+              <a:rPr lang="de-DE" smtClean="0"/>
+              <a:t>reenfox is based on the XDM data model. </a:t>
             </a:r>
             <a:r>
               <a:rPr lang="de-DE" baseline="0" smtClean="0"/>
-              <a:t>. In order to describe a file system tree, you may navigate between resources (using foxpath), within resources (using XPath or foxpath), in non-XML resources (using XPath extensions) and across resource boundaries (using foxpath). </a:t>
+              <a:t>Every value describing or constraining a resource is an XDM value, which means it is a sequence of zero or more items, which may be atomic values, nodes, maps or arrays.</a:t>
             </a:r>
             <a:endParaRPr lang="de-DE"/>
           </a:p>
@@ -1755,7 +1750,7 @@
     </p:spTree>
     <p:extLst>
       <p:ext uri="{BB962C8B-B14F-4D97-AF65-F5344CB8AC3E}">
-        <p14:creationId xmlns:p14="http://schemas.microsoft.com/office/powerpoint/2010/main" val="2587037435"/>
+        <p14:creationId xmlns:p14="http://schemas.microsoft.com/office/powerpoint/2010/main" val="3549090886"/>
       </p:ext>
     </p:extLst>
   </p:cSld>
@@ -1811,11 +1806,11 @@
           <a:p>
             <a:r>
               <a:rPr lang="de-DE" smtClean="0"/>
-              <a:t>Strong navigational skills</a:t>
+              <a:t>Second key feature:</a:t>
             </a:r>
             <a:r>
               <a:rPr lang="de-DE" baseline="0" smtClean="0"/>
-              <a:t> are a sound base for designing a file system validation language. But there is a serious danger in losing oneself in a wealth of possibilities, adding adhoc features in an uncontrolled way, ending up with a messy toolkit, not a language. A file system validation language requires a solid base of clear concepts. The key concepts of greenfox have been derived from the key concepts of SHACL, the new validation language for RDF. Some additional abstraction allowed me to detach the SHACL concepts from RDF and re-attach them to file system resources. </a:t>
+              <a:t> advanced navigation skills. In order to describe a file system tree, you may navigate between resources (using foxpath), within resources (using XPath or foxpath), in non-XML resources (using XPath extensions) and across resource boundaries (using foxpath). </a:t>
             </a:r>
             <a:endParaRPr lang="de-DE"/>
           </a:p>
@@ -1853,7 +1848,7 @@
     </p:spTree>
     <p:extLst>
       <p:ext uri="{BB962C8B-B14F-4D97-AF65-F5344CB8AC3E}">
-        <p14:creationId xmlns:p14="http://schemas.microsoft.com/office/powerpoint/2010/main" val="2586646265"/>
+        <p14:creationId xmlns:p14="http://schemas.microsoft.com/office/powerpoint/2010/main" val="2587037435"/>
       </p:ext>
     </p:extLst>
   </p:cSld>
@@ -1909,59 +1904,11 @@
           <a:p>
             <a:r>
               <a:rPr lang="de-DE" smtClean="0"/>
-              <a:t>Here they are, the key concepts. Let us begin with three most</a:t>
+              <a:t>Strong navigational skills</a:t>
             </a:r>
             <a:r>
               <a:rPr lang="de-DE" baseline="0" smtClean="0"/>
-              <a:t> basic terms: </a:t>
-            </a:r>
-            <a:r>
-              <a:rPr lang="de-DE" b="1" baseline="0" smtClean="0"/>
-              <a:t>resource</a:t>
-            </a:r>
-            <a:r>
-              <a:rPr lang="de-DE" baseline="0" smtClean="0"/>
-              <a:t>, </a:t>
-            </a:r>
-            <a:r>
-              <a:rPr lang="de-DE" b="1" baseline="0" smtClean="0"/>
-              <a:t>shape</a:t>
-            </a:r>
-            <a:r>
-              <a:rPr lang="de-DE" baseline="0" smtClean="0"/>
-              <a:t>, </a:t>
-            </a:r>
-            <a:r>
-              <a:rPr lang="de-DE" b="1" baseline="0" smtClean="0"/>
-              <a:t>constraint</a:t>
-            </a:r>
-            <a:r>
-              <a:rPr lang="de-DE" baseline="0" smtClean="0"/>
-              <a:t>. A </a:t>
-            </a:r>
-            <a:r>
-              <a:rPr lang="de-DE" b="1" baseline="0" smtClean="0"/>
-              <a:t>resource shape</a:t>
-            </a:r>
-            <a:r>
-              <a:rPr lang="de-DE" baseline="0" smtClean="0"/>
-              <a:t> checks predefined properties of a resource, like last modification date, file size or child resource names. These constraints apply to a target, a set of resources selected by the target declaration. Do we already have everything we need? What about constraints which </a:t>
-            </a:r>
-            <a:r>
-              <a:rPr lang="de-DE" baseline="0" smtClean="0"/>
-              <a:t>must </a:t>
-            </a:r>
-            <a:r>
-              <a:rPr lang="de-DE" baseline="0" smtClean="0"/>
-              <a:t>be applied to the value of an XPath </a:t>
-            </a:r>
-            <a:r>
-              <a:rPr lang="de-DE" baseline="0" smtClean="0"/>
-              <a:t>expression? The expression value is not a predefined resource property. We </a:t>
-            </a:r>
-            <a:r>
-              <a:rPr lang="de-DE" baseline="0" smtClean="0"/>
-              <a:t>introduce a second kind of shape, called a value shape. A value shape combines an expression with a set of constraints against which to check the expression value. The expression is evaluated in the context of the resource, thus maps it to a value which is called a resource value. Now we are complete: any constraint applies either to a predefined resource property, or to a resource value created by an expression.</a:t>
+              <a:t> are a sound base for designing a file system validation language. But there is a serious danger in losing oneself in a wealth of possibilities, adding adhoc features in an uncontrolled way, ending up with a messy toolkit, not a language. A file system validation language requires a solid base of clear concepts. The key concepts of greenfox have been derived from the key concepts of SHACL, the new validation language for RDF. Some additional abstraction allowed me to detach the SHACL concepts from RDF and re-attach them to file system resources. </a:t>
             </a:r>
             <a:endParaRPr lang="de-DE"/>
           </a:p>
@@ -1999,7 +1946,7 @@
     </p:spTree>
     <p:extLst>
       <p:ext uri="{BB962C8B-B14F-4D97-AF65-F5344CB8AC3E}">
-        <p14:creationId xmlns:p14="http://schemas.microsoft.com/office/powerpoint/2010/main" val="3048165536"/>
+        <p14:creationId xmlns:p14="http://schemas.microsoft.com/office/powerpoint/2010/main" val="2586646265"/>
       </p:ext>
     </p:extLst>
   </p:cSld>
@@ -2053,46 +2000,45 @@
           <a:bodyPr/>
           <a:lstStyle/>
           <a:p>
-            <a:pPr marL="0" marR="0" lvl="0" indent="0" algn="l" defTabSz="914400" rtl="0" eaLnBrk="0" fontAlgn="base" latinLnBrk="0" hangingPunct="0">
-              <a:lnSpc>
-                <a:spcPct val="100000"/>
-              </a:lnSpc>
-              <a:spcBef>
-                <a:spcPct val="30000"/>
-              </a:spcBef>
-              <a:spcAft>
-                <a:spcPct val="0"/>
-              </a:spcAft>
-              <a:buClrTx/>
-              <a:buSzTx/>
-              <a:buFontTx/>
-              <a:buNone/>
-              <a:tabLst/>
-              <a:defRPr/>
-            </a:pPr>
             <a:r>
               <a:rPr lang="de-DE" smtClean="0"/>
-              <a:t>Every constraint is</a:t>
+              <a:t>Here they are, the key concepts. Let us begin with three most</a:t>
             </a:r>
             <a:r>
               <a:rPr lang="de-DE" baseline="0" smtClean="0"/>
-              <a:t> a condition which a resource either satisfies or violates. Every constraint is </a:t>
-            </a:r>
-            <a:r>
-              <a:rPr lang="de-DE" i="1" smtClean="0"/>
-              <a:t>declared</a:t>
+              <a:t> basic terms: </a:t>
+            </a:r>
+            <a:r>
+              <a:rPr lang="de-DE" b="1" baseline="0" smtClean="0"/>
+              <a:t>resource</a:t>
             </a:r>
             <a:r>
               <a:rPr lang="de-DE" baseline="0" smtClean="0"/>
-              <a:t> by a shape. A constraint declaration is like a function call: it identifies the kind of check to be performed, and it supplies parameter values. Every available kind of check is called a </a:t>
+              <a:t>, </a:t>
             </a:r>
             <a:r>
               <a:rPr lang="de-DE" b="1" baseline="0" smtClean="0"/>
-              <a:t>Constraint Component</a:t>
+              <a:t>shape</a:t>
             </a:r>
             <a:r>
               <a:rPr lang="de-DE" baseline="0" smtClean="0"/>
-              <a:t>. The check operation has an input consisting of the parameter values and a resource or a resource value; the output is a validation result.</a:t>
+              <a:t>, </a:t>
+            </a:r>
+            <a:r>
+              <a:rPr lang="de-DE" b="1" baseline="0" smtClean="0"/>
+              <a:t>constraint</a:t>
+            </a:r>
+            <a:r>
+              <a:rPr lang="de-DE" baseline="0" smtClean="0"/>
+              <a:t>. A </a:t>
+            </a:r>
+            <a:r>
+              <a:rPr lang="de-DE" b="1" baseline="0" smtClean="0"/>
+              <a:t>resource shape</a:t>
+            </a:r>
+            <a:r>
+              <a:rPr lang="de-DE" baseline="0" smtClean="0"/>
+              <a:t> checks predefined properties of a resource, like last modification date, file size or child resource names. These constraints apply to a target, a set of resources selected by the target declaration. Do we already have everything we need? What about constraints which must be applied to the value of an XPath expression? The expression value is not a predefined resource property. We introduce a second kind of shape, called a value shape. A value shape combines an expression with a set of constraints against which to check the expression value. The expression is evaluated in the context of the resource, thus maps it to a value which is called a resource value. Now we are complete: any constraint applies either to a predefined resource property, or to a resource value created by an expression.</a:t>
             </a:r>
             <a:endParaRPr lang="de-DE"/>
           </a:p>
@@ -2130,7 +2076,7 @@
     </p:spTree>
     <p:extLst>
       <p:ext uri="{BB962C8B-B14F-4D97-AF65-F5344CB8AC3E}">
-        <p14:creationId xmlns:p14="http://schemas.microsoft.com/office/powerpoint/2010/main" val="1458709113"/>
+        <p14:creationId xmlns:p14="http://schemas.microsoft.com/office/powerpoint/2010/main" val="3048165536"/>
       </p:ext>
     </p:extLst>
   </p:cSld>
@@ -2184,53 +2130,46 @@
           <a:bodyPr/>
           <a:lstStyle/>
           <a:p>
+            <a:pPr marL="0" marR="0" lvl="0" indent="0" algn="l" defTabSz="914400" rtl="0" eaLnBrk="0" fontAlgn="base" latinLnBrk="0" hangingPunct="0">
+              <a:lnSpc>
+                <a:spcPct val="100000"/>
+              </a:lnSpc>
+              <a:spcBef>
+                <a:spcPct val="30000"/>
+              </a:spcBef>
+              <a:spcAft>
+                <a:spcPct val="0"/>
+              </a:spcAft>
+              <a:buClrTx/>
+              <a:buSzTx/>
+              <a:buFontTx/>
+              <a:buNone/>
+              <a:tabLst/>
+              <a:defRPr/>
+            </a:pPr>
             <a:r>
               <a:rPr lang="de-DE" smtClean="0"/>
-              <a:t>So what does it mean that</a:t>
+              <a:t>Every constraint is</a:t>
             </a:r>
             <a:r>
               <a:rPr lang="de-DE" baseline="0" smtClean="0"/>
-              <a:t> a resource is validated against a constraint? What is really checked is always a </a:t>
+              <a:t> a condition which a resource either satisfies or violates. Every constraint is </a:t>
+            </a:r>
+            <a:r>
+              <a:rPr lang="de-DE" i="1" smtClean="0"/>
+              <a:t>declared</a:t>
+            </a:r>
+            <a:r>
+              <a:rPr lang="de-DE" baseline="0" smtClean="0"/>
+              <a:t> by a shape. A constraint declaration is like a function call: it identifies the kind of check to be performed, and it supplies parameter values. Every available kind of check is called a </a:t>
             </a:r>
             <a:r>
               <a:rPr lang="de-DE" b="1" baseline="0" smtClean="0"/>
-              <a:t>value</a:t>
+              <a:t>Constraint Component</a:t>
             </a:r>
             <a:r>
               <a:rPr lang="de-DE" baseline="0" smtClean="0"/>
-              <a:t>. It is either the value of a predefined </a:t>
-            </a:r>
-            <a:r>
-              <a:rPr lang="de-DE" b="1" baseline="0" smtClean="0"/>
-              <a:t>resource property</a:t>
-            </a:r>
-            <a:r>
-              <a:rPr lang="de-DE" baseline="0" smtClean="0"/>
-              <a:t>, or a </a:t>
-            </a:r>
-            <a:r>
-              <a:rPr lang="de-DE" b="1" baseline="0" smtClean="0"/>
-              <a:t>resource value</a:t>
-            </a:r>
-            <a:r>
-              <a:rPr lang="de-DE" baseline="0" smtClean="0"/>
-              <a:t>, </a:t>
-            </a:r>
-            <a:r>
-              <a:rPr lang="de-DE" baseline="0" smtClean="0"/>
-              <a:t>created </a:t>
-            </a:r>
-            <a:r>
-              <a:rPr lang="de-DE" baseline="0" smtClean="0"/>
-              <a:t>by an expession. A resource value can be </a:t>
-            </a:r>
-            <a:r>
-              <a:rPr lang="de-DE" b="1" baseline="0" smtClean="0"/>
-              <a:t>anything expressable</a:t>
-            </a:r>
-            <a:r>
-              <a:rPr lang="de-DE" baseline="0" smtClean="0"/>
-              <a:t> in XDM. Usually it captures some kind of content, something found within the resource. But it may as well reflect something found in the surroundings of the resource, for example a file in a sibling folder, or content in a distant file.</a:t>
+              <a:t>. The check operation has an input consisting of the parameter values and a resource or a resource value; the output is a validation result.</a:t>
             </a:r>
             <a:endParaRPr lang="de-DE"/>
           </a:p>
@@ -2268,7 +2207,7 @@
     </p:spTree>
     <p:extLst>
       <p:ext uri="{BB962C8B-B14F-4D97-AF65-F5344CB8AC3E}">
-        <p14:creationId xmlns:p14="http://schemas.microsoft.com/office/powerpoint/2010/main" val="3897025310"/>
+        <p14:creationId xmlns:p14="http://schemas.microsoft.com/office/powerpoint/2010/main" val="1458709113"/>
       </p:ext>
     </p:extLst>
   </p:cSld>
@@ -2324,27 +2263,43 @@
           <a:p>
             <a:r>
               <a:rPr lang="de-DE" smtClean="0"/>
-              <a:t>A close look at </a:t>
+              <a:t>So what does it mean that</a:t>
             </a:r>
             <a:r>
               <a:rPr lang="de-DE" baseline="0" smtClean="0"/>
-              <a:t>how a value shape creates and constrains a resource value. In this example, the value is the sequence of all &lt;airport&gt; elements with an @href attribute </a:t>
-            </a:r>
-            <a:r>
-              <a:rPr lang="de-DE" i="1" baseline="0" smtClean="0"/>
-              <a:t>and</a:t>
+              <a:t> a resource is validated against a constraint? What is really checked is always a </a:t>
+            </a:r>
+            <a:r>
+              <a:rPr lang="de-DE" b="1" baseline="0" smtClean="0"/>
+              <a:t>value</a:t>
             </a:r>
             <a:r>
               <a:rPr lang="de-DE" baseline="0" smtClean="0"/>
-              <a:t> also child elements. The @empty attribute declares an </a:t>
+              <a:t>. It is either the value of a predefined </a:t>
             </a:r>
             <a:r>
               <a:rPr lang="de-DE" b="1" baseline="0" smtClean="0"/>
-              <a:t>ExpressionValueEmpty</a:t>
+              <a:t>resource property</a:t>
             </a:r>
             <a:r>
               <a:rPr lang="de-DE" baseline="0" smtClean="0"/>
-              <a:t> constraint. This means that the resource value must be the empty sequence. If the value is non-empty, a red validation result is created., otherwise a green one. The validation result is a standardized dataset identifying resource (@filePath) and constraint (@constraintComp) and reporting the violation (@valueCount and „valueNodePath“ elements).</a:t>
+              <a:t>, or a </a:t>
+            </a:r>
+            <a:r>
+              <a:rPr lang="de-DE" b="1" baseline="0" smtClean="0"/>
+              <a:t>resource value</a:t>
+            </a:r>
+            <a:r>
+              <a:rPr lang="de-DE" baseline="0" smtClean="0"/>
+              <a:t>, created by an expession. A resource value can be </a:t>
+            </a:r>
+            <a:r>
+              <a:rPr lang="de-DE" b="1" baseline="0" smtClean="0"/>
+              <a:t>anything expressable</a:t>
+            </a:r>
+            <a:r>
+              <a:rPr lang="de-DE" baseline="0" smtClean="0"/>
+              <a:t> in XDM. Usually it captures some kind of content, something found within the resource. But it may as well reflect something found in the surroundings of the resource, for example a file in a sibling folder, or content in a distant file.</a:t>
             </a:r>
             <a:endParaRPr lang="de-DE"/>
           </a:p>
@@ -2382,7 +2337,7 @@
     </p:spTree>
     <p:extLst>
       <p:ext uri="{BB962C8B-B14F-4D97-AF65-F5344CB8AC3E}">
-        <p14:creationId xmlns:p14="http://schemas.microsoft.com/office/powerpoint/2010/main" val="1818013040"/>
+        <p14:creationId xmlns:p14="http://schemas.microsoft.com/office/powerpoint/2010/main" val="3897025310"/>
       </p:ext>
     </p:extLst>
   </p:cSld>
@@ -2438,19 +2393,27 @@
           <a:p>
             <a:r>
               <a:rPr lang="de-DE" smtClean="0"/>
-              <a:t>Resource values can be created by </a:t>
-            </a:r>
-            <a:r>
-              <a:rPr lang="de-DE" smtClean="0"/>
-              <a:t>an XPath </a:t>
-            </a:r>
-            <a:r>
-              <a:rPr lang="de-DE" smtClean="0"/>
-              <a:t>or foxpath expression. </a:t>
+              <a:t>A close look at </a:t>
             </a:r>
             <a:r>
               <a:rPr lang="de-DE" baseline="0" smtClean="0"/>
-              <a:t>Let us look at a few expressions creating resource values.</a:t>
+              <a:t>how a value shape creates and constrains a resource value. In this example, the value is the sequence of all &lt;airport&gt; elements with an @href attribute </a:t>
+            </a:r>
+            <a:r>
+              <a:rPr lang="de-DE" i="1" baseline="0" smtClean="0"/>
+              <a:t>and</a:t>
+            </a:r>
+            <a:r>
+              <a:rPr lang="de-DE" baseline="0" smtClean="0"/>
+              <a:t> also child elements. The @empty attribute declares an </a:t>
+            </a:r>
+            <a:r>
+              <a:rPr lang="de-DE" b="1" baseline="0" smtClean="0"/>
+              <a:t>ExpressionValueEmpty</a:t>
+            </a:r>
+            <a:r>
+              <a:rPr lang="de-DE" baseline="0" smtClean="0"/>
+              <a:t> constraint. This means that the resource value must be the empty sequence. If the value is non-empty, a red validation result is created., otherwise a green one. The validation result is a standardized dataset identifying resource (@filePath) and constraint (@constraintComp) and reporting the violation (@valueCount and „valueNodePath“ elements).</a:t>
             </a:r>
             <a:endParaRPr lang="de-DE"/>
           </a:p>
@@ -2488,7 +2451,7 @@
     </p:spTree>
     <p:extLst>
       <p:ext uri="{BB962C8B-B14F-4D97-AF65-F5344CB8AC3E}">
-        <p14:creationId xmlns:p14="http://schemas.microsoft.com/office/powerpoint/2010/main" val="403574972"/>
+        <p14:creationId xmlns:p14="http://schemas.microsoft.com/office/powerpoint/2010/main" val="1818013040"/>
       </p:ext>
     </p:extLst>
   </p:cSld>
@@ -2642,11 +2605,11 @@
           <a:p>
             <a:r>
               <a:rPr lang="de-DE" smtClean="0"/>
-              <a:t>Here comes an example of a folder using foxpath value shapes for ensuring some basic qualities. The resource</a:t>
+              <a:t>Resource values can be created by an XPath or foxpath expression. </a:t>
             </a:r>
             <a:r>
               <a:rPr lang="de-DE" baseline="0" smtClean="0"/>
-              <a:t> values defined are: (a) empty files; (b) ill-formed XML files; (c) ill-formed JSON files. In all cases the value is submitted to the EmptyExpressionValue constraint. Violations will be listed in the validation results.</a:t>
+              <a:t>Let us look at a few expressions creating resource values.</a:t>
             </a:r>
             <a:endParaRPr lang="de-DE"/>
           </a:p>
@@ -2675,7 +2638,7 @@
               <a:pPr>
                 <a:defRPr/>
               </a:pPr>
-              <a:t>20</a:t>
+              <a:t>21</a:t>
             </a:fld>
             <a:endParaRPr lang="de-DE" altLang="de-DE"/>
           </a:p>
@@ -2684,7 +2647,7 @@
     </p:spTree>
     <p:extLst>
       <p:ext uri="{BB962C8B-B14F-4D97-AF65-F5344CB8AC3E}">
-        <p14:creationId xmlns:p14="http://schemas.microsoft.com/office/powerpoint/2010/main" val="2713434532"/>
+        <p14:creationId xmlns:p14="http://schemas.microsoft.com/office/powerpoint/2010/main" val="403574972"/>
       </p:ext>
     </p:extLst>
   </p:cSld>
@@ -2740,19 +2703,11 @@
           <a:p>
             <a:r>
               <a:rPr lang="de-DE" smtClean="0"/>
-              <a:t>And here comes an example of an external resource value – a value found </a:t>
+              <a:t>Here comes an example of a folder using foxpath value shapes for ensuring some basic qualities. The resource</a:t>
             </a:r>
             <a:r>
               <a:rPr lang="de-DE" baseline="0" smtClean="0"/>
-              <a:t>outside of the resource. The foxpath expression returns the </a:t>
-            </a:r>
-            <a:r>
-              <a:rPr lang="de-DE" i="1" baseline="0" smtClean="0"/>
-              <a:t>expected</a:t>
-            </a:r>
-            <a:r>
-              <a:rPr lang="de-DE" baseline="0" smtClean="0"/>
-              <a:t> return code, fetched from the appropriate cell in a CSV file found in the environment of the resource being validated.</a:t>
+              <a:t> values defined are: (a) empty files; (b) ill-formed XML files; (c) ill-formed JSON files. In all cases the value is submitted to the EmptyExpressionValue constraint. Violations will be listed in the validation results.</a:t>
             </a:r>
             <a:endParaRPr lang="de-DE"/>
           </a:p>
@@ -2781,7 +2736,7 @@
               <a:pPr>
                 <a:defRPr/>
               </a:pPr>
-              <a:t>21</a:t>
+              <a:t>22</a:t>
             </a:fld>
             <a:endParaRPr lang="de-DE" altLang="de-DE"/>
           </a:p>
@@ -2790,7 +2745,7 @@
     </p:spTree>
     <p:extLst>
       <p:ext uri="{BB962C8B-B14F-4D97-AF65-F5344CB8AC3E}">
-        <p14:creationId xmlns:p14="http://schemas.microsoft.com/office/powerpoint/2010/main" val="2551796588"/>
+        <p14:creationId xmlns:p14="http://schemas.microsoft.com/office/powerpoint/2010/main" val="2713434532"/>
       </p:ext>
     </p:extLst>
   </p:cSld>
@@ -2846,11 +2801,19 @@
           <a:p>
             <a:r>
               <a:rPr lang="de-DE" smtClean="0"/>
-              <a:t>By default, the</a:t>
+              <a:t>And here comes an example of an external resource value – a value found </a:t>
             </a:r>
             <a:r>
               <a:rPr lang="de-DE" baseline="0" smtClean="0"/>
-              <a:t> resource value expression is evaluated in the context of the target resource. This may be inconvenient, for example if you would like to check several attributes on an element selected by a non-trivial selection. This selection would have to be repeated as part of the expressions returning those attributes. You can avoid this by using &lt;focusNode&gt;s, which select the context nodes to be used by the value shapes which they contain. As focus nodes may be nested, value shapes can be arranged in a tree of &lt;focusNode&gt;s describing a traversal of the target resource.</a:t>
+              <a:t>outside of the resource. The foxpath expression returns the </a:t>
+            </a:r>
+            <a:r>
+              <a:rPr lang="de-DE" i="1" baseline="0" smtClean="0"/>
+              <a:t>expected</a:t>
+            </a:r>
+            <a:r>
+              <a:rPr lang="de-DE" baseline="0" smtClean="0"/>
+              <a:t> return code, fetched from the appropriate cell in a CSV file found in the environment of the resource being validated.</a:t>
             </a:r>
             <a:endParaRPr lang="de-DE"/>
           </a:p>
@@ -2879,7 +2842,7 @@
               <a:pPr>
                 <a:defRPr/>
               </a:pPr>
-              <a:t>22</a:t>
+              <a:t>23</a:t>
             </a:fld>
             <a:endParaRPr lang="de-DE" altLang="de-DE"/>
           </a:p>
@@ -2888,7 +2851,7 @@
     </p:spTree>
     <p:extLst>
       <p:ext uri="{BB962C8B-B14F-4D97-AF65-F5344CB8AC3E}">
-        <p14:creationId xmlns:p14="http://schemas.microsoft.com/office/powerpoint/2010/main" val="1374758302"/>
+        <p14:creationId xmlns:p14="http://schemas.microsoft.com/office/powerpoint/2010/main" val="2551796588"/>
       </p:ext>
     </p:extLst>
   </p:cSld>
@@ -2944,57 +2907,11 @@
           <a:p>
             <a:r>
               <a:rPr lang="de-DE" smtClean="0"/>
-              <a:t>The greenfox schema</a:t>
+              <a:t>By default, the</a:t>
             </a:r>
             <a:r>
               <a:rPr lang="de-DE" baseline="0" smtClean="0"/>
-              <a:t> language enables the definition of new constraint components which can be used like built-in components. The component is </a:t>
-            </a:r>
-            <a:r>
-              <a:rPr lang="de-DE" b="1" baseline="0" smtClean="0"/>
-              <a:t>defined</a:t>
-            </a:r>
-            <a:r>
-              <a:rPr lang="de-DE" baseline="0" smtClean="0"/>
-              <a:t> by a &lt;constraintComponent&gt; element with attributes and child elements specifying the component name and the </a:t>
-            </a:r>
-            <a:r>
-              <a:rPr lang="de-DE" baseline="0" smtClean="0"/>
-              <a:t>parameter names and types. </a:t>
-            </a:r>
-          </a:p>
-          <a:p>
-            <a:r>
-              <a:rPr lang="de-DE" baseline="0" smtClean="0"/>
-              <a:t>The </a:t>
-            </a:r>
-            <a:r>
-              <a:rPr lang="de-DE" baseline="0" smtClean="0"/>
-              <a:t>definition </a:t>
-            </a:r>
-            <a:r>
-              <a:rPr lang="de-DE" baseline="0" smtClean="0"/>
-              <a:t>includes </a:t>
-            </a:r>
-            <a:r>
-              <a:rPr lang="de-DE" baseline="0" smtClean="0"/>
-              <a:t>a validator, which is an XPath or foxpath expression performing the validation of a resource or resource value against the constraint. The </a:t>
-            </a:r>
-            <a:r>
-              <a:rPr lang="de-DE" baseline="0" smtClean="0"/>
-              <a:t>expression references the parameter values via </a:t>
-            </a:r>
-            <a:r>
-              <a:rPr lang="de-DE" baseline="0" smtClean="0"/>
-              <a:t>pre-bound variables. How is the component then used? As you remember, constraints are </a:t>
-            </a:r>
-            <a:r>
-              <a:rPr lang="de-DE" b="1" baseline="0" smtClean="0"/>
-              <a:t>declared</a:t>
-            </a:r>
-            <a:r>
-              <a:rPr lang="de-DE" baseline="0" smtClean="0"/>
-              <a:t>, and constraint declarations resemble function calls – they identify the constraint component and provide the parameter values. This is accomplished following simple syntax rules. User-defined components thus hide the complexity of the validating expression behind a declarative interface which is a set of constraint parameters.</a:t>
+              <a:t> resource value expression is evaluated in the context of the target resource. This may be inconvenient, for example if you would like to check several attributes on an element selected by a non-trivial selection. This selection would have to be repeated as part of the expressions returning those attributes. You can avoid this by using &lt;focusNode&gt;s, which select the context nodes to be used by the value shapes which they contain. As focus nodes may be nested, value shapes can be arranged in a tree of &lt;focusNode&gt;s describing a traversal of the target resource.</a:t>
             </a:r>
             <a:endParaRPr lang="de-DE"/>
           </a:p>
@@ -3023,7 +2940,7 @@
               <a:pPr>
                 <a:defRPr/>
               </a:pPr>
-              <a:t>23</a:t>
+              <a:t>24</a:t>
             </a:fld>
             <a:endParaRPr lang="de-DE" altLang="de-DE"/>
           </a:p>
@@ -3032,7 +2949,7 @@
     </p:spTree>
     <p:extLst>
       <p:ext uri="{BB962C8B-B14F-4D97-AF65-F5344CB8AC3E}">
-        <p14:creationId xmlns:p14="http://schemas.microsoft.com/office/powerpoint/2010/main" val="1179064612"/>
+        <p14:creationId xmlns:p14="http://schemas.microsoft.com/office/powerpoint/2010/main" val="1374758302"/>
       </p:ext>
     </p:extLst>
   </p:cSld>
@@ -3088,19 +3005,33 @@
           <a:p>
             <a:r>
               <a:rPr lang="de-DE" smtClean="0"/>
-              <a:t>The key concepts of resources, shapes and constraints define a validation chemistry of sorts. Every validation process is composed of elementary operations – the validation</a:t>
+              <a:t>The greenfox schema</a:t>
             </a:r>
             <a:r>
               <a:rPr lang="de-DE" baseline="0" smtClean="0"/>
-              <a:t> of a single resource against a single constraint. Consequently, the </a:t>
+              <a:t> language enables the definition of new constraint components which can be used like built-in components. The component is </a:t>
             </a:r>
             <a:r>
               <a:rPr lang="de-DE" b="1" baseline="0" smtClean="0"/>
-              <a:t>result</a:t>
+              <a:t>defined</a:t>
             </a:r>
             <a:r>
               <a:rPr lang="de-DE" baseline="0" smtClean="0"/>
-              <a:t> of any validation is a collection of elementary building blocks, describing the validation of a single resource against a single constraint. These building blocks are uniform, as they use a common vocabulary.</a:t>
+              <a:t> by a &lt;constraintComponent&gt; element with attributes and child elements specifying the component name and the parameter names and types. </a:t>
+            </a:r>
+          </a:p>
+          <a:p>
+            <a:r>
+              <a:rPr lang="de-DE" baseline="0" smtClean="0"/>
+              <a:t>The definition includes a validator, which is an XPath or foxpath expression performing the validation of a resource or resource value against the constraint. The expression references the parameter values via pre-bound variables. How is the component then used? As you remember, constraints are </a:t>
+            </a:r>
+            <a:r>
+              <a:rPr lang="de-DE" b="1" baseline="0" smtClean="0"/>
+              <a:t>declared</a:t>
+            </a:r>
+            <a:r>
+              <a:rPr lang="de-DE" baseline="0" smtClean="0"/>
+              <a:t>, and constraint declarations resemble function calls – they identify the constraint component and provide the parameter values. This is accomplished following simple syntax rules. User-defined components thus hide the complexity of the validating expression behind a declarative interface which is a set of constraint parameters.</a:t>
             </a:r>
             <a:endParaRPr lang="de-DE"/>
           </a:p>
@@ -3129,7 +3060,7 @@
               <a:pPr>
                 <a:defRPr/>
               </a:pPr>
-              <a:t>24</a:t>
+              <a:t>25</a:t>
             </a:fld>
             <a:endParaRPr lang="de-DE" altLang="de-DE"/>
           </a:p>
@@ -3138,7 +3069,7 @@
     </p:spTree>
     <p:extLst>
       <p:ext uri="{BB962C8B-B14F-4D97-AF65-F5344CB8AC3E}">
-        <p14:creationId xmlns:p14="http://schemas.microsoft.com/office/powerpoint/2010/main" val="1873326140"/>
+        <p14:creationId xmlns:p14="http://schemas.microsoft.com/office/powerpoint/2010/main" val="1179064612"/>
       </p:ext>
     </p:extLst>
   </p:cSld>
@@ -3194,11 +3125,19 @@
           <a:p>
             <a:r>
               <a:rPr lang="de-DE" smtClean="0"/>
-              <a:t>It follows </a:t>
+              <a:t>The key concepts of resources, shapes and constraints define a validation chemistry of sorts. Every validation process is composed of elementary operations – the validation</a:t>
             </a:r>
             <a:r>
               <a:rPr lang="de-DE" baseline="0" smtClean="0"/>
-              <a:t>that a formal definition of file system validation is trivial. Remember: a schema is a collection of shapes. A shape is applied to a target which is a collection of resources. A shape is a collection of constraints. The validation report is an integration over all shapes, for each shape over all focus resources, for each focus resource and shape over all constraints.</a:t>
+              <a:t> of a single resource against a single constraint. Consequently, the </a:t>
+            </a:r>
+            <a:r>
+              <a:rPr lang="de-DE" b="1" baseline="0" smtClean="0"/>
+              <a:t>result</a:t>
+            </a:r>
+            <a:r>
+              <a:rPr lang="de-DE" baseline="0" smtClean="0"/>
+              <a:t> of any validation is a collection of elementary building blocks, describing the validation of a single resource against a single constraint. These building blocks are uniform, as they use a common vocabulary.</a:t>
             </a:r>
             <a:endParaRPr lang="de-DE"/>
           </a:p>
@@ -3227,7 +3166,7 @@
               <a:pPr>
                 <a:defRPr/>
               </a:pPr>
-              <a:t>25</a:t>
+              <a:t>26</a:t>
             </a:fld>
             <a:endParaRPr lang="de-DE" altLang="de-DE"/>
           </a:p>
@@ -3236,7 +3175,7 @@
     </p:spTree>
     <p:extLst>
       <p:ext uri="{BB962C8B-B14F-4D97-AF65-F5344CB8AC3E}">
-        <p14:creationId xmlns:p14="http://schemas.microsoft.com/office/powerpoint/2010/main" val="4113545859"/>
+        <p14:creationId xmlns:p14="http://schemas.microsoft.com/office/powerpoint/2010/main" val="1873326140"/>
       </p:ext>
     </p:extLst>
   </p:cSld>
@@ -3290,6 +3229,14 @@
           <a:bodyPr/>
           <a:lstStyle/>
           <a:p>
+            <a:r>
+              <a:rPr lang="de-DE" smtClean="0"/>
+              <a:t>It follows </a:t>
+            </a:r>
+            <a:r>
+              <a:rPr lang="de-DE" baseline="0" smtClean="0"/>
+              <a:t>that a formal definition of file system validation is trivial. Remember: a schema is a collection of shapes. A shape is applied to a target which is a collection of resources. A shape is a collection of constraints. The validation report is an integration over all shapes, for each shape over all focus resources, for each focus resource and shape over all constraints.</a:t>
+            </a:r>
             <a:endParaRPr lang="de-DE"/>
           </a:p>
         </p:txBody>
@@ -3326,7 +3273,7 @@
     </p:spTree>
     <p:extLst>
       <p:ext uri="{BB962C8B-B14F-4D97-AF65-F5344CB8AC3E}">
-        <p14:creationId xmlns:p14="http://schemas.microsoft.com/office/powerpoint/2010/main" val="2047415851"/>
+        <p14:creationId xmlns:p14="http://schemas.microsoft.com/office/powerpoint/2010/main" val="4113545859"/>
       </p:ext>
     </p:extLst>
   </p:cSld>
@@ -3407,7 +3354,7 @@
               <a:pPr>
                 <a:defRPr/>
               </a:pPr>
-              <a:t>28</a:t>
+              <a:t>29</a:t>
             </a:fld>
             <a:endParaRPr lang="de-DE" altLang="de-DE"/>
           </a:p>
@@ -3416,7 +3363,7 @@
     </p:spTree>
     <p:extLst>
       <p:ext uri="{BB962C8B-B14F-4D97-AF65-F5344CB8AC3E}">
-        <p14:creationId xmlns:p14="http://schemas.microsoft.com/office/powerpoint/2010/main" val="2263527957"/>
+        <p14:creationId xmlns:p14="http://schemas.microsoft.com/office/powerpoint/2010/main" val="2047415851"/>
       </p:ext>
     </p:extLst>
   </p:cSld>
@@ -3470,22 +3417,6 @@
           <a:bodyPr/>
           <a:lstStyle/>
           <a:p>
-            <a:r>
-              <a:rPr lang="de-DE" smtClean="0"/>
-              <a:t>The folder and file</a:t>
-            </a:r>
-            <a:r>
-              <a:rPr lang="de-DE" baseline="0" smtClean="0"/>
-              <a:t> shapes which we saw so far described the </a:t>
-            </a:r>
-            <a:r>
-              <a:rPr lang="de-DE" i="1" baseline="0" smtClean="0"/>
-              <a:t>contents</a:t>
-            </a:r>
-            <a:r>
-              <a:rPr lang="de-DE" baseline="0" smtClean="0"/>
-              <a:t> of the target resources, and checking did not require knowledge about the surrounding world. This is not necessarily so - constraints may relate to information outside of the resource under investigation.  In this example, the resource value is given by the fooValue elements found in the document. They are checked against a codelist defined in a file found by a navigation across the file system. The constraint is expressed by a foxpath.</a:t>
-            </a:r>
             <a:endParaRPr lang="de-DE"/>
           </a:p>
         </p:txBody>
@@ -3513,7 +3444,113 @@
               <a:pPr>
                 <a:defRPr/>
               </a:pPr>
-              <a:t>29</a:t>
+              <a:t>30</a:t>
+            </a:fld>
+            <a:endParaRPr lang="de-DE" altLang="de-DE"/>
+          </a:p>
+        </p:txBody>
+      </p:sp>
+    </p:spTree>
+    <p:extLst>
+      <p:ext uri="{BB962C8B-B14F-4D97-AF65-F5344CB8AC3E}">
+        <p14:creationId xmlns:p14="http://schemas.microsoft.com/office/powerpoint/2010/main" val="2263527957"/>
+      </p:ext>
+    </p:extLst>
+  </p:cSld>
+  <p:clrMapOvr>
+    <a:masterClrMapping/>
+  </p:clrMapOvr>
+</p:notes>
+</file>
+
+<file path=ppt/notesSlides/notesSlide29.xml><?xml version="1.0" encoding="utf-8"?>
+<p:notes xmlns:a="http://schemas.openxmlformats.org/drawingml/2006/main" xmlns:r="http://schemas.openxmlformats.org/officeDocument/2006/relationships" xmlns:p="http://schemas.openxmlformats.org/presentationml/2006/main">
+  <p:cSld>
+    <p:spTree>
+      <p:nvGrpSpPr>
+        <p:cNvPr id="1" name=""/>
+        <p:cNvGrpSpPr/>
+        <p:nvPr/>
+      </p:nvGrpSpPr>
+      <p:grpSpPr>
+        <a:xfrm>
+          <a:off x="0" y="0"/>
+          <a:ext cx="0" cy="0"/>
+          <a:chOff x="0" y="0"/>
+          <a:chExt cx="0" cy="0"/>
+        </a:xfrm>
+      </p:grpSpPr>
+      <p:sp>
+        <p:nvSpPr>
+          <p:cNvPr id="2" name="Slide Image Placeholder 1"/>
+          <p:cNvSpPr>
+            <a:spLocks noGrp="1" noRot="1" noChangeAspect="1"/>
+          </p:cNvSpPr>
+          <p:nvPr>
+            <p:ph type="sldImg"/>
+          </p:nvPr>
+        </p:nvSpPr>
+        <p:spPr/>
+      </p:sp>
+      <p:sp>
+        <p:nvSpPr>
+          <p:cNvPr id="3" name="Notes Placeholder 2"/>
+          <p:cNvSpPr>
+            <a:spLocks noGrp="1"/>
+          </p:cNvSpPr>
+          <p:nvPr>
+            <p:ph type="body" idx="1"/>
+          </p:nvPr>
+        </p:nvSpPr>
+        <p:spPr/>
+        <p:txBody>
+          <a:bodyPr/>
+          <a:lstStyle/>
+          <a:p>
+            <a:r>
+              <a:rPr lang="de-DE" smtClean="0"/>
+              <a:t>The folder and file</a:t>
+            </a:r>
+            <a:r>
+              <a:rPr lang="de-DE" baseline="0" smtClean="0"/>
+              <a:t> shapes which we saw so far described the </a:t>
+            </a:r>
+            <a:r>
+              <a:rPr lang="de-DE" i="1" baseline="0" smtClean="0"/>
+              <a:t>contents</a:t>
+            </a:r>
+            <a:r>
+              <a:rPr lang="de-DE" baseline="0" smtClean="0"/>
+              <a:t> of the target resources, and checking did not require knowledge about the surrounding world. This is not necessarily so - constraints may relate to information outside of the resource under investigation.  In this example, the resource value is given by the fooValue elements found in the document. They are checked against a codelist defined in a file found by a navigation across the file system. The constraint is expressed by a foxpath.</a:t>
+            </a:r>
+            <a:endParaRPr lang="de-DE"/>
+          </a:p>
+        </p:txBody>
+      </p:sp>
+      <p:sp>
+        <p:nvSpPr>
+          <p:cNvPr id="4" name="Slide Number Placeholder 3"/>
+          <p:cNvSpPr>
+            <a:spLocks noGrp="1"/>
+          </p:cNvSpPr>
+          <p:nvPr>
+            <p:ph type="sldNum" sz="quarter" idx="10"/>
+          </p:nvPr>
+        </p:nvSpPr>
+        <p:spPr/>
+        <p:txBody>
+          <a:bodyPr/>
+          <a:lstStyle/>
+          <a:p>
+            <a:pPr>
+              <a:defRPr/>
+            </a:pPr>
+            <a:fld id="{C808F741-F631-4E00-8D1F-D4687A839150}" type="slidenum">
+              <a:rPr lang="de-DE" altLang="de-DE" smtClean="0"/>
+              <a:pPr>
+                <a:defRPr/>
+              </a:pPr>
+              <a:t>31</a:t>
             </a:fld>
             <a:endParaRPr lang="de-DE" altLang="de-DE"/>
           </a:p>
@@ -3630,6 +3667,104 @@
 </p:notes>
 </file>
 
+<file path=ppt/notesSlides/notesSlide30.xml><?xml version="1.0" encoding="utf-8"?>
+<p:notes xmlns:a="http://schemas.openxmlformats.org/drawingml/2006/main" xmlns:r="http://schemas.openxmlformats.org/officeDocument/2006/relationships" xmlns:p="http://schemas.openxmlformats.org/presentationml/2006/main">
+  <p:cSld>
+    <p:spTree>
+      <p:nvGrpSpPr>
+        <p:cNvPr id="1" name=""/>
+        <p:cNvGrpSpPr/>
+        <p:nvPr/>
+      </p:nvGrpSpPr>
+      <p:grpSpPr>
+        <a:xfrm>
+          <a:off x="0" y="0"/>
+          <a:ext cx="0" cy="0"/>
+          <a:chOff x="0" y="0"/>
+          <a:chExt cx="0" cy="0"/>
+        </a:xfrm>
+      </p:grpSpPr>
+      <p:sp>
+        <p:nvSpPr>
+          <p:cNvPr id="2" name="Slide Image Placeholder 1"/>
+          <p:cNvSpPr>
+            <a:spLocks noGrp="1" noRot="1" noChangeAspect="1"/>
+          </p:cNvSpPr>
+          <p:nvPr>
+            <p:ph type="sldImg"/>
+          </p:nvPr>
+        </p:nvSpPr>
+        <p:spPr/>
+      </p:sp>
+      <p:sp>
+        <p:nvSpPr>
+          <p:cNvPr id="3" name="Notes Placeholder 2"/>
+          <p:cNvSpPr>
+            <a:spLocks noGrp="1"/>
+          </p:cNvSpPr>
+          <p:nvPr>
+            <p:ph type="body" idx="1"/>
+          </p:nvPr>
+        </p:nvSpPr>
+        <p:spPr/>
+        <p:txBody>
+          <a:bodyPr/>
+          <a:lstStyle/>
+          <a:p>
+            <a:r>
+              <a:rPr lang="de-DE" smtClean="0"/>
+              <a:t>The target declaration in the first row selects</a:t>
+            </a:r>
+            <a:r>
+              <a:rPr lang="de-DE" baseline="0" smtClean="0"/>
+              <a:t> a child resource. In the second row, descendant resources are selected. In the third row, navigation into a sibling folder is followed by downward navigation. In the last two rows conditions are added, referring to the containing folder name and even file contents.</a:t>
+            </a:r>
+            <a:endParaRPr lang="de-DE"/>
+          </a:p>
+        </p:txBody>
+      </p:sp>
+      <p:sp>
+        <p:nvSpPr>
+          <p:cNvPr id="4" name="Slide Number Placeholder 3"/>
+          <p:cNvSpPr>
+            <a:spLocks noGrp="1"/>
+          </p:cNvSpPr>
+          <p:nvPr>
+            <p:ph type="sldNum" sz="quarter" idx="10"/>
+          </p:nvPr>
+        </p:nvSpPr>
+        <p:spPr/>
+        <p:txBody>
+          <a:bodyPr/>
+          <a:lstStyle/>
+          <a:p>
+            <a:pPr>
+              <a:defRPr/>
+            </a:pPr>
+            <a:fld id="{C808F741-F631-4E00-8D1F-D4687A839150}" type="slidenum">
+              <a:rPr lang="de-DE" altLang="de-DE" smtClean="0"/>
+              <a:pPr>
+                <a:defRPr/>
+              </a:pPr>
+              <a:t>32</a:t>
+            </a:fld>
+            <a:endParaRPr lang="de-DE" altLang="de-DE"/>
+          </a:p>
+        </p:txBody>
+      </p:sp>
+    </p:spTree>
+    <p:extLst>
+      <p:ext uri="{BB962C8B-B14F-4D97-AF65-F5344CB8AC3E}">
+        <p14:creationId xmlns:p14="http://schemas.microsoft.com/office/powerpoint/2010/main" val="4126180884"/>
+      </p:ext>
+    </p:extLst>
+  </p:cSld>
+  <p:clrMapOvr>
+    <a:masterClrMapping/>
+  </p:clrMapOvr>
+</p:notes>
+</file>
+
 <file path=ppt/notesSlides/notesSlide4.xml><?xml version="1.0" encoding="utf-8"?>
 <p:notes xmlns:a="http://schemas.openxmlformats.org/drawingml/2006/main" xmlns:r="http://schemas.openxmlformats.org/officeDocument/2006/relationships" xmlns:p="http://schemas.openxmlformats.org/presentationml/2006/main">
   <p:cSld>
@@ -4219,15 +4354,7 @@
             </a:r>
             <a:r>
               <a:rPr lang="de-DE" baseline="0" smtClean="0"/>
-              <a:t> constraint, declared by the @eq attribute: every item of the expression value must be equal to the value of the attribute. The second value shape maps the file to a sequence of </a:t>
-            </a:r>
-            <a:r>
-              <a:rPr lang="de-DE" baseline="0" smtClean="0"/>
-              <a:t>@</a:t>
-            </a:r>
-            <a:r>
-              <a:rPr lang="de-DE" baseline="0" smtClean="0"/>
-              <a:t>uri attributes. The @like attribute declares an </a:t>
+              <a:t> constraint, declared by the @eq attribute: every item of the expression value must be equal to the value of the attribute. The second value shape maps the file to a sequence of @uri attributes. The @like attribute declares an </a:t>
             </a:r>
             <a:r>
               <a:rPr lang="de-DE" b="1" baseline="0" smtClean="0"/>
@@ -4333,11 +4460,7 @@
             </a:r>
             <a:r>
               <a:rPr lang="de-DE" baseline="0" smtClean="0"/>
-              <a:t> shape inside the folder shape. What does that mean? The target declaration of the file shape is re-evaluated in the context of every folder in the target of the containing folder shape. </a:t>
-            </a:r>
-            <a:r>
-              <a:rPr lang="de-DE" baseline="0" smtClean="0"/>
-              <a:t>But don‘t be deceived – a target declaration does not necessarily select children or descendants. It can move sideways or upward, too.</a:t>
+              <a:t> shape inside the folder shape. What does that mean? The target declaration of the file shape is re-evaluated in the context of every folder in the target of the containing folder shape. But don‘t be deceived – a target declaration does not necessarily select children or descendants. It can move sideways or upward, too.</a:t>
             </a:r>
             <a:endParaRPr lang="de-DE"/>
           </a:p>
@@ -17862,24 +17985,9 @@
           <a:p>
             <a:r>
               <a:rPr lang="de-DE" smtClean="0"/>
-              <a:t>Target declarations</a:t>
-            </a:r>
-            <a:br>
-              <a:rPr lang="de-DE" smtClean="0"/>
-            </a:br>
-            <a:r>
-              <a:rPr lang="de-DE"/>
-              <a:t> </a:t>
-            </a:r>
-            <a:r>
-              <a:rPr lang="de-DE" smtClean="0"/>
-              <a:t>  (</a:t>
-            </a:r>
-            <a:r>
-              <a:rPr lang="de-DE" i="1" smtClean="0"/>
-              <a:t>foxpath expressions)</a:t>
-            </a:r>
-            <a:endParaRPr lang="de-DE" i="1"/>
+              <a:t>Nesting shapes</a:t>
+            </a:r>
+            <a:endParaRPr lang="de-DE"/>
           </a:p>
         </p:txBody>
       </p:sp>
@@ -17964,364 +18072,98 @@
           </a:p>
         </p:txBody>
       </p:sp>
-      <p:graphicFrame>
-        <p:nvGraphicFramePr>
-          <p:cNvPr id="8" name="Table 7"/>
-          <p:cNvGraphicFramePr>
-            <a:graphicFrameLocks noGrp="1"/>
-          </p:cNvGraphicFramePr>
-          <p:nvPr>
-            <p:extLst>
-              <p:ext uri="{D42A27DB-BD31-4B8C-83A1-F6EECF244321}">
-                <p14:modId xmlns:p14="http://schemas.microsoft.com/office/powerpoint/2010/main" val="3727182175"/>
-              </p:ext>
-            </p:extLst>
-          </p:nvPr>
-        </p:nvGraphicFramePr>
-        <p:xfrm>
-          <a:off x="35496" y="2052424"/>
-          <a:ext cx="9073008" cy="3307080"/>
-        </p:xfrm>
-        <a:graphic>
-          <a:graphicData uri="http://schemas.openxmlformats.org/drawingml/2006/table">
-            <a:tbl>
-              <a:tblPr firstRow="1" bandRow="1">
-                <a:tableStyleId>{5C22544A-7EE6-4342-B048-85BDC9FD1C3A}</a:tableStyleId>
-              </a:tblPr>
-              <a:tblGrid>
-                <a:gridCol w="4608512"/>
-                <a:gridCol w="4464496"/>
-              </a:tblGrid>
-              <a:tr h="370840">
-                <a:tc>
-                  <a:txBody>
-                    <a:bodyPr/>
-                    <a:lstStyle/>
-                    <a:p>
-                      <a:r>
-                        <a:rPr lang="de-DE" smtClean="0"/>
-                        <a:t>Target declaration</a:t>
-                      </a:r>
-                      <a:endParaRPr lang="de-DE"/>
-                    </a:p>
-                  </a:txBody>
-                  <a:tcPr>
-                    <a:solidFill>
-                      <a:srgbClr val="006600"/>
-                    </a:solidFill>
-                  </a:tcPr>
-                </a:tc>
-                <a:tc>
-                  <a:txBody>
-                    <a:bodyPr/>
-                    <a:lstStyle/>
-                    <a:p>
-                      <a:r>
-                        <a:rPr lang="de-DE" smtClean="0"/>
-                        <a:t>Selection</a:t>
-                      </a:r>
-                      <a:endParaRPr lang="de-DE"/>
-                    </a:p>
-                  </a:txBody>
-                  <a:tcPr>
-                    <a:solidFill>
-                      <a:srgbClr val="006600"/>
-                    </a:solidFill>
-                  </a:tcPr>
-                </a:tc>
-              </a:tr>
-              <a:tr h="370840">
-                <a:tc>
-                  <a:txBody>
-                    <a:bodyPr/>
-                    <a:lstStyle/>
-                    <a:p>
-                      <a:r>
-                        <a:rPr lang="de-DE" smtClean="0">
-                          <a:latin typeface="Courier New" panose="02070309020205020404" pitchFamily="49" charset="0"/>
-                          <a:cs typeface="Courier New" panose="02070309020205020404" pitchFamily="49" charset="0"/>
-                        </a:rPr>
-                        <a:t>catalog.xml</a:t>
-                      </a:r>
-                      <a:endParaRPr lang="de-DE">
-                        <a:latin typeface="Courier New" panose="02070309020205020404" pitchFamily="49" charset="0"/>
-                        <a:cs typeface="Courier New" panose="02070309020205020404" pitchFamily="49" charset="0"/>
-                      </a:endParaRPr>
-                    </a:p>
-                  </a:txBody>
-                  <a:tcPr/>
-                </a:tc>
-                <a:tc>
-                  <a:txBody>
-                    <a:bodyPr/>
-                    <a:lstStyle/>
-                    <a:p>
-                      <a:r>
-                        <a:rPr lang="de-DE" smtClean="0"/>
-                        <a:t>The catalog.xml file</a:t>
-                      </a:r>
-                      <a:r>
-                        <a:rPr lang="de-DE" baseline="0" smtClean="0"/>
-                        <a:t> </a:t>
-                      </a:r>
-                      <a:r>
-                        <a:rPr lang="de-DE" i="1" baseline="0" smtClean="0"/>
-                        <a:t>in</a:t>
-                      </a:r>
-                      <a:r>
-                        <a:rPr lang="de-DE" baseline="0" smtClean="0"/>
-                        <a:t> the current folder</a:t>
-                      </a:r>
-                      <a:endParaRPr lang="de-DE"/>
-                    </a:p>
-                  </a:txBody>
-                  <a:tcPr/>
-                </a:tc>
-              </a:tr>
-              <a:tr h="370840">
-                <a:tc>
-                  <a:txBody>
-                    <a:bodyPr/>
-                    <a:lstStyle/>
-                    <a:p>
-                      <a:r>
-                        <a:rPr lang="de-DE" smtClean="0">
-                          <a:latin typeface="Courier New" panose="02070309020205020404" pitchFamily="49" charset="0"/>
-                          <a:cs typeface="Courier New" panose="02070309020205020404" pitchFamily="49" charset="0"/>
-                        </a:rPr>
-                        <a:t>.\\catalog.xml</a:t>
-                      </a:r>
-                      <a:endParaRPr lang="de-DE">
-                        <a:latin typeface="Courier New" panose="02070309020205020404" pitchFamily="49" charset="0"/>
-                        <a:cs typeface="Courier New" panose="02070309020205020404" pitchFamily="49" charset="0"/>
-                      </a:endParaRPr>
-                    </a:p>
-                  </a:txBody>
-                  <a:tcPr/>
-                </a:tc>
-                <a:tc>
-                  <a:txBody>
-                    <a:bodyPr/>
-                    <a:lstStyle/>
-                    <a:p>
-                      <a:r>
-                        <a:rPr lang="de-DE" smtClean="0"/>
-                        <a:t>catalog.xml files </a:t>
-                      </a:r>
-                      <a:r>
-                        <a:rPr lang="de-DE" i="1" smtClean="0"/>
-                        <a:t>under</a:t>
-                      </a:r>
-                      <a:r>
-                        <a:rPr lang="de-DE" smtClean="0"/>
-                        <a:t> the current folder</a:t>
-                      </a:r>
-                      <a:endParaRPr lang="de-DE"/>
-                    </a:p>
-                  </a:txBody>
-                  <a:tcPr/>
-                </a:tc>
-              </a:tr>
-              <a:tr h="370840">
-                <a:tc>
-                  <a:txBody>
-                    <a:bodyPr/>
-                    <a:lstStyle/>
-                    <a:p>
-                      <a:r>
-                        <a:rPr lang="de-DE" smtClean="0">
-                          <a:latin typeface="Courier New" panose="02070309020205020404" pitchFamily="49" charset="0"/>
-                          <a:cs typeface="Courier New" panose="02070309020205020404" pitchFamily="49" charset="0"/>
-                        </a:rPr>
-                        <a:t>..\projects\\catalog.xml</a:t>
-                      </a:r>
-                      <a:endParaRPr lang="de-DE">
-                        <a:latin typeface="Courier New" panose="02070309020205020404" pitchFamily="49" charset="0"/>
-                        <a:cs typeface="Courier New" panose="02070309020205020404" pitchFamily="49" charset="0"/>
-                      </a:endParaRPr>
-                    </a:p>
-                  </a:txBody>
-                  <a:tcPr/>
-                </a:tc>
-                <a:tc>
-                  <a:txBody>
-                    <a:bodyPr/>
-                    <a:lstStyle/>
-                    <a:p>
-                      <a:r>
-                        <a:rPr lang="de-DE" smtClean="0"/>
-                        <a:t>All catalog.xml files in or</a:t>
-                      </a:r>
-                      <a:r>
-                        <a:rPr lang="de-DE" baseline="0" smtClean="0"/>
-                        <a:t> under the </a:t>
-                      </a:r>
-                      <a:r>
-                        <a:rPr lang="de-DE" baseline="0" smtClean="0">
-                          <a:latin typeface="Courier New" panose="02070309020205020404" pitchFamily="49" charset="0"/>
-                          <a:cs typeface="Courier New" panose="02070309020205020404" pitchFamily="49" charset="0"/>
-                        </a:rPr>
-                        <a:t>projects</a:t>
-                      </a:r>
-                      <a:r>
-                        <a:rPr lang="de-DE" baseline="0" smtClean="0"/>
-                        <a:t> sibling of the current folder</a:t>
-                      </a:r>
-                      <a:endParaRPr lang="de-DE"/>
-                    </a:p>
-                  </a:txBody>
-                  <a:tcPr/>
-                </a:tc>
-              </a:tr>
-              <a:tr h="370840">
-                <a:tc>
-                  <a:txBody>
-                    <a:bodyPr/>
-                    <a:lstStyle/>
-                    <a:p>
-                      <a:pPr marL="0" marR="0" lvl="0" indent="0" algn="l" defTabSz="914400" rtl="0" eaLnBrk="1" fontAlgn="auto" latinLnBrk="0" hangingPunct="1">
-                        <a:lnSpc>
-                          <a:spcPct val="100000"/>
-                        </a:lnSpc>
-                        <a:spcBef>
-                          <a:spcPts val="0"/>
-                        </a:spcBef>
-                        <a:spcAft>
-                          <a:spcPts val="0"/>
-                        </a:spcAft>
-                        <a:buClrTx/>
-                        <a:buSzTx/>
-                        <a:buFontTx/>
-                        <a:buNone/>
-                        <a:tabLst/>
-                        <a:defRPr/>
-                      </a:pPr>
-                      <a:r>
-                        <a:rPr lang="de-DE" smtClean="0">
-                          <a:latin typeface="Courier New" panose="02070309020205020404" pitchFamily="49" charset="0"/>
-                          <a:cs typeface="Courier New" panose="02070309020205020404" pitchFamily="49" charset="0"/>
-                        </a:rPr>
-                        <a:t>..\projects\\catalog.xml</a:t>
-                      </a:r>
-                    </a:p>
-                    <a:p>
-                      <a:r>
-                        <a:rPr lang="de-DE" smtClean="0">
-                          <a:latin typeface="Courier New" panose="02070309020205020404" pitchFamily="49" charset="0"/>
-                          <a:cs typeface="Courier New" panose="02070309020205020404" pitchFamily="49" charset="0"/>
-                        </a:rPr>
-                        <a:t>    [parent~::xsd]</a:t>
-                      </a:r>
-                      <a:endParaRPr lang="de-DE">
-                        <a:latin typeface="Courier New" panose="02070309020205020404" pitchFamily="49" charset="0"/>
-                        <a:cs typeface="Courier New" panose="02070309020205020404" pitchFamily="49" charset="0"/>
-                      </a:endParaRPr>
-                    </a:p>
-                  </a:txBody>
-                  <a:tcPr/>
-                </a:tc>
-                <a:tc>
-                  <a:txBody>
-                    <a:bodyPr/>
-                    <a:lstStyle/>
-                    <a:p>
-                      <a:r>
-                        <a:rPr lang="de-DE" smtClean="0"/>
-                        <a:t>As before, but filtering</a:t>
-                      </a:r>
-                      <a:r>
-                        <a:rPr lang="de-DE" baseline="0" smtClean="0"/>
-                        <a:t> by name of containing folder</a:t>
-                      </a:r>
-                      <a:endParaRPr lang="de-DE"/>
-                    </a:p>
-                  </a:txBody>
-                  <a:tcPr/>
-                </a:tc>
-              </a:tr>
-              <a:tr h="370840">
-                <a:tc>
-                  <a:txBody>
-                    <a:bodyPr/>
-                    <a:lstStyle/>
-                    <a:p>
-                      <a:r>
-                        <a:rPr lang="de-DE" smtClean="0">
-                          <a:latin typeface="Courier New" panose="02070309020205020404" pitchFamily="49" charset="0"/>
-                          <a:cs typeface="Courier New" panose="02070309020205020404" pitchFamily="49" charset="0"/>
-                        </a:rPr>
-                        <a:t>..\projects\\catalog.xml</a:t>
-                      </a:r>
-                    </a:p>
-                    <a:p>
-                      <a:pPr marL="0" marR="0" lvl="0" indent="0" algn="l" defTabSz="914400" rtl="0" eaLnBrk="1" fontAlgn="auto" latinLnBrk="0" hangingPunct="1">
-                        <a:lnSpc>
-                          <a:spcPct val="100000"/>
-                        </a:lnSpc>
-                        <a:spcBef>
-                          <a:spcPts val="0"/>
-                        </a:spcBef>
-                        <a:spcAft>
-                          <a:spcPts val="0"/>
-                        </a:spcAft>
-                        <a:buClrTx/>
-                        <a:buSzTx/>
-                        <a:buFontTx/>
-                        <a:buNone/>
-                        <a:tabLst/>
-                        <a:defRPr/>
-                      </a:pPr>
-                      <a:r>
-                        <a:rPr lang="de-DE" smtClean="0">
-                          <a:latin typeface="Courier New" panose="02070309020205020404" pitchFamily="49" charset="0"/>
-                          <a:cs typeface="Courier New" panose="02070309020205020404" pitchFamily="49" charset="0"/>
-                        </a:rPr>
-                        <a:t>    [parent~::xsd]</a:t>
-                      </a:r>
-                    </a:p>
-                    <a:p>
-                      <a:r>
-                        <a:rPr lang="de-DE" smtClean="0">
-                          <a:latin typeface="Courier New" panose="02070309020205020404" pitchFamily="49" charset="0"/>
-                          <a:cs typeface="Courier New" panose="02070309020205020404" pitchFamily="49" charset="0"/>
-                        </a:rPr>
-                        <a:t>    [//@rewritePrefix]</a:t>
-                      </a:r>
-                      <a:endParaRPr lang="de-DE">
-                        <a:latin typeface="Courier New" panose="02070309020205020404" pitchFamily="49" charset="0"/>
-                        <a:cs typeface="Courier New" panose="02070309020205020404" pitchFamily="49" charset="0"/>
-                      </a:endParaRPr>
-                    </a:p>
-                  </a:txBody>
-                  <a:tcPr/>
-                </a:tc>
-                <a:tc>
-                  <a:txBody>
-                    <a:bodyPr/>
-                    <a:lstStyle/>
-                    <a:p>
-                      <a:r>
-                        <a:rPr lang="de-DE" smtClean="0"/>
-                        <a:t>As before, but</a:t>
-                      </a:r>
-                      <a:r>
-                        <a:rPr lang="de-DE" baseline="0" smtClean="0"/>
-                        <a:t> filtering also by file content</a:t>
-                      </a:r>
-                      <a:endParaRPr lang="de-DE"/>
-                    </a:p>
-                  </a:txBody>
-                  <a:tcPr/>
-                </a:tc>
-              </a:tr>
-            </a:tbl>
-          </a:graphicData>
-        </a:graphic>
-      </p:graphicFrame>
+      <p:pic>
+        <p:nvPicPr>
+          <p:cNvPr id="11" name="Picture 10"/>
+          <p:cNvPicPr>
+            <a:picLocks noChangeAspect="1"/>
+          </p:cNvPicPr>
+          <p:nvPr/>
+        </p:nvPicPr>
+        <p:blipFill>
+          <a:blip r:embed="rId3"/>
+          <a:stretch>
+            <a:fillRect/>
+          </a:stretch>
+        </p:blipFill>
+        <p:spPr>
+          <a:xfrm>
+            <a:off x="14230" y="1524642"/>
+            <a:ext cx="9144000" cy="5320632"/>
+          </a:xfrm>
+          <a:prstGeom prst="rect">
+            <a:avLst/>
+          </a:prstGeom>
+        </p:spPr>
+      </p:pic>
+      <p:sp>
+        <p:nvSpPr>
+          <p:cNvPr id="3" name="Rectangle 2"/>
+          <p:cNvSpPr/>
+          <p:nvPr/>
+        </p:nvSpPr>
+        <p:spPr bwMode="auto">
+          <a:xfrm>
+            <a:off x="28460" y="4077071"/>
+            <a:ext cx="9129770" cy="2768203"/>
+          </a:xfrm>
+          <a:prstGeom prst="rect">
+            <a:avLst/>
+          </a:prstGeom>
+          <a:solidFill>
+            <a:schemeClr val="bg1"/>
+          </a:solidFill>
+          <a:ln w="9525" cap="flat" cmpd="sng" algn="ctr">
+            <a:noFill/>
+            <a:prstDash val="solid"/>
+            <a:round/>
+            <a:headEnd type="none" w="med" len="med"/>
+            <a:tailEnd type="none" w="med" len="med"/>
+          </a:ln>
+          <a:effectLst/>
+          <a:extLst/>
+        </p:spPr>
+        <p:txBody>
+          <a:bodyPr vert="horz" wrap="square" lIns="91440" tIns="45720" rIns="91440" bIns="45720" numCol="1" rtlCol="0" anchor="t" anchorCtr="0" compatLnSpc="1">
+            <a:prstTxWarp prst="textNoShape">
+              <a:avLst/>
+            </a:prstTxWarp>
+          </a:bodyPr>
+          <a:lstStyle/>
+          <a:p>
+            <a:pPr marL="0" marR="0" indent="0" algn="l" defTabSz="914400" rtl="0" eaLnBrk="1" fontAlgn="base" latinLnBrk="0" hangingPunct="1">
+              <a:lnSpc>
+                <a:spcPct val="100000"/>
+              </a:lnSpc>
+              <a:spcBef>
+                <a:spcPct val="0"/>
+              </a:spcBef>
+              <a:spcAft>
+                <a:spcPct val="0"/>
+              </a:spcAft>
+              <a:buClrTx/>
+              <a:buSzTx/>
+              <a:buFontTx/>
+              <a:buNone/>
+              <a:tabLst/>
+            </a:pPr>
+            <a:endParaRPr kumimoji="0" lang="de-DE" sz="1800" b="1" i="0" u="none" strike="noStrike" cap="none" normalizeH="0" baseline="0" smtClean="0">
+              <a:ln>
+                <a:noFill/>
+              </a:ln>
+              <a:solidFill>
+                <a:schemeClr val="tx1"/>
+              </a:solidFill>
+              <a:effectLst/>
+              <a:latin typeface="Arial" panose="020B0604020202020204" pitchFamily="34" charset="0"/>
+            </a:endParaRPr>
+          </a:p>
+        </p:txBody>
+      </p:sp>
     </p:spTree>
     <p:extLst>
       <p:ext uri="{BB962C8B-B14F-4D97-AF65-F5344CB8AC3E}">
-        <p14:creationId xmlns:p14="http://schemas.microsoft.com/office/powerpoint/2010/main" val="210222838"/>
+        <p14:creationId xmlns:p14="http://schemas.microsoft.com/office/powerpoint/2010/main" val="3531156344"/>
       </p:ext>
     </p:extLst>
   </p:cSld>
@@ -18372,7 +18214,7 @@
           <a:p>
             <a:r>
               <a:rPr lang="de-DE" smtClean="0"/>
-              <a:t>Validating JSON contents</a:t>
+              <a:t>Nesting shapes</a:t>
             </a:r>
             <a:endParaRPr lang="de-DE"/>
           </a:p>
@@ -18454,6 +18296,171 @@
                 <a:defRPr/>
               </a:pPr>
               <a:t>11</a:t>
+            </a:fld>
+            <a:endParaRPr lang="de-DE" altLang="en-US"/>
+          </a:p>
+        </p:txBody>
+      </p:sp>
+      <p:pic>
+        <p:nvPicPr>
+          <p:cNvPr id="11" name="Picture 10"/>
+          <p:cNvPicPr>
+            <a:picLocks noChangeAspect="1"/>
+          </p:cNvPicPr>
+          <p:nvPr/>
+        </p:nvPicPr>
+        <p:blipFill>
+          <a:blip r:embed="rId3"/>
+          <a:stretch>
+            <a:fillRect/>
+          </a:stretch>
+        </p:blipFill>
+        <p:spPr>
+          <a:xfrm>
+            <a:off x="0" y="1524643"/>
+            <a:ext cx="9144000" cy="5320632"/>
+          </a:xfrm>
+          <a:prstGeom prst="rect">
+            <a:avLst/>
+          </a:prstGeom>
+        </p:spPr>
+      </p:pic>
+    </p:spTree>
+    <p:extLst>
+      <p:ext uri="{BB962C8B-B14F-4D97-AF65-F5344CB8AC3E}">
+        <p14:creationId xmlns:p14="http://schemas.microsoft.com/office/powerpoint/2010/main" val="1329057294"/>
+      </p:ext>
+    </p:extLst>
+  </p:cSld>
+  <p:clrMapOvr>
+    <a:masterClrMapping/>
+  </p:clrMapOvr>
+  <p:timing>
+    <p:tnLst>
+      <p:par>
+        <p:cTn id="1" dur="indefinite" restart="never" nodeType="tmRoot"/>
+      </p:par>
+    </p:tnLst>
+  </p:timing>
+</p:sld>
+</file>
+
+<file path=ppt/slides/slide12.xml><?xml version="1.0" encoding="utf-8"?>
+<p:sld xmlns:a="http://schemas.openxmlformats.org/drawingml/2006/main" xmlns:r="http://schemas.openxmlformats.org/officeDocument/2006/relationships" xmlns:p="http://schemas.openxmlformats.org/presentationml/2006/main">
+  <p:cSld>
+    <p:spTree>
+      <p:nvGrpSpPr>
+        <p:cNvPr id="1" name=""/>
+        <p:cNvGrpSpPr/>
+        <p:nvPr/>
+      </p:nvGrpSpPr>
+      <p:grpSpPr>
+        <a:xfrm>
+          <a:off x="0" y="0"/>
+          <a:ext cx="0" cy="0"/>
+          <a:chOff x="0" y="0"/>
+          <a:chExt cx="0" cy="0"/>
+        </a:xfrm>
+      </p:grpSpPr>
+      <p:sp>
+        <p:nvSpPr>
+          <p:cNvPr id="2" name="Title 1"/>
+          <p:cNvSpPr>
+            <a:spLocks noGrp="1"/>
+          </p:cNvSpPr>
+          <p:nvPr>
+            <p:ph type="title"/>
+          </p:nvPr>
+        </p:nvSpPr>
+        <p:spPr/>
+        <p:txBody>
+          <a:bodyPr/>
+          <a:lstStyle/>
+          <a:p>
+            <a:r>
+              <a:rPr lang="de-DE" smtClean="0"/>
+              <a:t>Validating JSON contents</a:t>
+            </a:r>
+            <a:endParaRPr lang="de-DE"/>
+          </a:p>
+        </p:txBody>
+      </p:sp>
+      <p:sp>
+        <p:nvSpPr>
+          <p:cNvPr id="4" name="Date Placeholder 3"/>
+          <p:cNvSpPr>
+            <a:spLocks noGrp="1"/>
+          </p:cNvSpPr>
+          <p:nvPr>
+            <p:ph type="dt" sz="half" idx="10"/>
+          </p:nvPr>
+        </p:nvSpPr>
+        <p:spPr/>
+        <p:txBody>
+          <a:bodyPr/>
+          <a:lstStyle/>
+          <a:p>
+            <a:pPr>
+              <a:defRPr/>
+            </a:pPr>
+            <a:r>
+              <a:rPr lang="de-DE" altLang="de-DE" smtClean="0"/>
+              <a:t>2020-02-15</a:t>
+            </a:r>
+            <a:endParaRPr lang="de-DE" altLang="en-US"/>
+          </a:p>
+        </p:txBody>
+      </p:sp>
+      <p:sp>
+        <p:nvSpPr>
+          <p:cNvPr id="5" name="Footer Placeholder 4"/>
+          <p:cNvSpPr>
+            <a:spLocks noGrp="1"/>
+          </p:cNvSpPr>
+          <p:nvPr>
+            <p:ph type="ftr" sz="quarter" idx="11"/>
+          </p:nvPr>
+        </p:nvSpPr>
+        <p:spPr/>
+        <p:txBody>
+          <a:bodyPr/>
+          <a:lstStyle/>
+          <a:p>
+            <a:pPr>
+              <a:defRPr/>
+            </a:pPr>
+            <a:r>
+              <a:rPr lang="de-DE" altLang="en-US" smtClean="0"/>
+              <a:t>Greenfox</a:t>
+            </a:r>
+            <a:endParaRPr lang="de-DE" altLang="en-US"/>
+          </a:p>
+        </p:txBody>
+      </p:sp>
+      <p:sp>
+        <p:nvSpPr>
+          <p:cNvPr id="6" name="Slide Number Placeholder 5"/>
+          <p:cNvSpPr>
+            <a:spLocks noGrp="1"/>
+          </p:cNvSpPr>
+          <p:nvPr>
+            <p:ph type="sldNum" sz="quarter" idx="12"/>
+          </p:nvPr>
+        </p:nvSpPr>
+        <p:spPr/>
+        <p:txBody>
+          <a:bodyPr/>
+          <a:lstStyle/>
+          <a:p>
+            <a:pPr>
+              <a:defRPr/>
+            </a:pPr>
+            <a:fld id="{F031B2F4-27D1-4E53-97CF-1947CD75B185}" type="slidenum">
+              <a:rPr lang="de-DE" altLang="en-US" smtClean="0"/>
+              <a:pPr>
+                <a:defRPr/>
+              </a:pPr>
+              <a:t>12</a:t>
             </a:fld>
             <a:endParaRPr lang="de-DE" altLang="en-US"/>
           </a:p>
@@ -18910,7 +18917,7 @@
 </p:sld>
 </file>
 
-<file path=ppt/slides/slide12.xml><?xml version="1.0" encoding="utf-8"?>
+<file path=ppt/slides/slide13.xml><?xml version="1.0" encoding="utf-8"?>
 <p:sld xmlns:a="http://schemas.openxmlformats.org/drawingml/2006/main" xmlns:r="http://schemas.openxmlformats.org/officeDocument/2006/relationships" xmlns:p="http://schemas.openxmlformats.org/presentationml/2006/main">
   <p:cSld>
     <p:spTree>
@@ -19037,7 +19044,7 @@
               <a:pPr>
                 <a:defRPr/>
               </a:pPr>
-              <a:t>12</a:t>
+              <a:t>13</a:t>
             </a:fld>
             <a:endParaRPr lang="de-DE" altLang="en-US"/>
           </a:p>
@@ -19506,7 +19513,7 @@
 </p:sld>
 </file>
 
-<file path=ppt/slides/slide13.xml><?xml version="1.0" encoding="utf-8"?>
+<file path=ppt/slides/slide14.xml><?xml version="1.0" encoding="utf-8"?>
 <p:sld xmlns:a="http://schemas.openxmlformats.org/drawingml/2006/main" xmlns:r="http://schemas.openxmlformats.org/officeDocument/2006/relationships" xmlns:p="http://schemas.openxmlformats.org/presentationml/2006/main">
   <p:cSld>
     <p:spTree>
@@ -19738,7 +19745,7 @@
               <a:pPr>
                 <a:defRPr/>
               </a:pPr>
-              <a:t>13</a:t>
+              <a:t>14</a:t>
             </a:fld>
             <a:endParaRPr lang="de-DE" altLang="en-US"/>
           </a:p>
@@ -19924,7 +19931,7 @@
 </p:sld>
 </file>
 
-<file path=ppt/slides/slide14.xml><?xml version="1.0" encoding="utf-8"?>
+<file path=ppt/slides/slide15.xml><?xml version="1.0" encoding="utf-8"?>
 <p:sld xmlns:a="http://schemas.openxmlformats.org/drawingml/2006/main" xmlns:r="http://schemas.openxmlformats.org/officeDocument/2006/relationships" xmlns:p="http://schemas.openxmlformats.org/presentationml/2006/main">
   <p:cSld>
     <p:spTree>
@@ -20062,7 +20069,7 @@
               <a:pPr>
                 <a:defRPr/>
               </a:pPr>
-              <a:t>14</a:t>
+              <a:t>15</a:t>
             </a:fld>
             <a:endParaRPr lang="de-DE" altLang="en-US"/>
           </a:p>
@@ -20180,7 +20187,7 @@
 </p:sld>
 </file>
 
-<file path=ppt/slides/slide15.xml><?xml version="1.0" encoding="utf-8"?>
+<file path=ppt/slides/slide16.xml><?xml version="1.0" encoding="utf-8"?>
 <p:sld xmlns:a="http://schemas.openxmlformats.org/drawingml/2006/main" xmlns:r="http://schemas.openxmlformats.org/officeDocument/2006/relationships" xmlns:p="http://schemas.openxmlformats.org/presentationml/2006/main">
   <p:cSld>
     <p:spTree>
@@ -20883,7 +20890,7 @@
 </p:sld>
 </file>
 
-<file path=ppt/slides/slide16.xml><?xml version="1.0" encoding="utf-8"?>
+<file path=ppt/slides/slide17.xml><?xml version="1.0" encoding="utf-8"?>
 <p:sld xmlns:a="http://schemas.openxmlformats.org/drawingml/2006/main" xmlns:r="http://schemas.openxmlformats.org/officeDocument/2006/relationships" xmlns:p="http://schemas.openxmlformats.org/presentationml/2006/main">
   <p:cSld>
     <p:spTree>
@@ -21124,7 +21131,7 @@
               <a:pPr>
                 <a:defRPr/>
               </a:pPr>
-              <a:t>16</a:t>
+              <a:t>17</a:t>
             </a:fld>
             <a:endParaRPr lang="de-DE" altLang="en-US"/>
           </a:p>
@@ -21150,7 +21157,7 @@
 </p:sld>
 </file>
 
-<file path=ppt/slides/slide17.xml><?xml version="1.0" encoding="utf-8"?>
+<file path=ppt/slides/slide18.xml><?xml version="1.0" encoding="utf-8"?>
 <p:sld xmlns:a="http://schemas.openxmlformats.org/drawingml/2006/main" xmlns:r="http://schemas.openxmlformats.org/officeDocument/2006/relationships" xmlns:p="http://schemas.openxmlformats.org/presentationml/2006/main">
   <p:cSld>
     <p:spTree>
@@ -21265,7 +21272,7 @@
               <a:pPr>
                 <a:defRPr/>
               </a:pPr>
-              <a:t>17</a:t>
+              <a:t>18</a:t>
             </a:fld>
             <a:endParaRPr lang="de-DE" altLang="en-US"/>
           </a:p>
@@ -22757,7 +22764,7 @@
 </p:sld>
 </file>
 
-<file path=ppt/slides/slide18.xml><?xml version="1.0" encoding="utf-8"?>
+<file path=ppt/slides/slide19.xml><?xml version="1.0" encoding="utf-8"?>
 <p:sld xmlns:a="http://schemas.openxmlformats.org/drawingml/2006/main" xmlns:r="http://schemas.openxmlformats.org/officeDocument/2006/relationships" xmlns:p="http://schemas.openxmlformats.org/presentationml/2006/main">
   <p:cSld>
     <p:spTree>
@@ -22887,7 +22894,7 @@
               <a:pPr>
                 <a:defRPr/>
               </a:pPr>
-              <a:t>18</a:t>
+              <a:t>19</a:t>
             </a:fld>
             <a:endParaRPr lang="de-DE" altLang="en-US"/>
           </a:p>
@@ -23826,7 +23833,483 @@
 </p:sld>
 </file>
 
-<file path=ppt/slides/slide19.xml><?xml version="1.0" encoding="utf-8"?>
+<file path=ppt/slides/slide2.xml><?xml version="1.0" encoding="utf-8"?>
+<p:sld xmlns:a="http://schemas.openxmlformats.org/drawingml/2006/main" xmlns:r="http://schemas.openxmlformats.org/officeDocument/2006/relationships" xmlns:p="http://schemas.openxmlformats.org/presentationml/2006/main">
+  <p:cSld>
+    <p:spTree>
+      <p:nvGrpSpPr>
+        <p:cNvPr id="1" name=""/>
+        <p:cNvGrpSpPr/>
+        <p:nvPr/>
+      </p:nvGrpSpPr>
+      <p:grpSpPr>
+        <a:xfrm>
+          <a:off x="0" y="0"/>
+          <a:ext cx="0" cy="0"/>
+          <a:chOff x="0" y="0"/>
+          <a:chExt cx="0" cy="0"/>
+        </a:xfrm>
+      </p:grpSpPr>
+      <p:sp>
+        <p:nvSpPr>
+          <p:cNvPr id="2" name="Title 1"/>
+          <p:cNvSpPr>
+            <a:spLocks noGrp="1"/>
+          </p:cNvSpPr>
+          <p:nvPr>
+            <p:ph type="title"/>
+          </p:nvPr>
+        </p:nvSpPr>
+        <p:spPr/>
+        <p:txBody>
+          <a:bodyPr/>
+          <a:lstStyle/>
+          <a:p>
+            <a:r>
+              <a:rPr lang="de-DE" smtClean="0"/>
+              <a:t>Greenfox: definition</a:t>
+            </a:r>
+            <a:endParaRPr lang="de-DE"/>
+          </a:p>
+        </p:txBody>
+      </p:sp>
+      <p:sp>
+        <p:nvSpPr>
+          <p:cNvPr id="4" name="Date Placeholder 3"/>
+          <p:cNvSpPr>
+            <a:spLocks noGrp="1"/>
+          </p:cNvSpPr>
+          <p:nvPr>
+            <p:ph type="dt" sz="half" idx="10"/>
+          </p:nvPr>
+        </p:nvSpPr>
+        <p:spPr/>
+        <p:txBody>
+          <a:bodyPr/>
+          <a:lstStyle/>
+          <a:p>
+            <a:pPr>
+              <a:defRPr/>
+            </a:pPr>
+            <a:r>
+              <a:rPr lang="de-DE" altLang="de-DE" smtClean="0"/>
+              <a:t>2020-02-15</a:t>
+            </a:r>
+            <a:endParaRPr lang="de-DE" altLang="en-US"/>
+          </a:p>
+        </p:txBody>
+      </p:sp>
+      <p:sp>
+        <p:nvSpPr>
+          <p:cNvPr id="5" name="Footer Placeholder 4"/>
+          <p:cNvSpPr>
+            <a:spLocks noGrp="1"/>
+          </p:cNvSpPr>
+          <p:nvPr>
+            <p:ph type="ftr" sz="quarter" idx="11"/>
+          </p:nvPr>
+        </p:nvSpPr>
+        <p:spPr/>
+        <p:txBody>
+          <a:bodyPr/>
+          <a:lstStyle/>
+          <a:p>
+            <a:pPr>
+              <a:defRPr/>
+            </a:pPr>
+            <a:r>
+              <a:rPr lang="de-DE" altLang="en-US" smtClean="0"/>
+              <a:t>Greenfox</a:t>
+            </a:r>
+            <a:endParaRPr lang="de-DE" altLang="en-US"/>
+          </a:p>
+        </p:txBody>
+      </p:sp>
+      <p:sp>
+        <p:nvSpPr>
+          <p:cNvPr id="6" name="Slide Number Placeholder 5"/>
+          <p:cNvSpPr>
+            <a:spLocks noGrp="1"/>
+          </p:cNvSpPr>
+          <p:nvPr>
+            <p:ph type="sldNum" sz="quarter" idx="12"/>
+          </p:nvPr>
+        </p:nvSpPr>
+        <p:spPr/>
+        <p:txBody>
+          <a:bodyPr/>
+          <a:lstStyle/>
+          <a:p>
+            <a:pPr>
+              <a:defRPr/>
+            </a:pPr>
+            <a:fld id="{F031B2F4-27D1-4E53-97CF-1947CD75B185}" type="slidenum">
+              <a:rPr lang="de-DE" altLang="en-US" smtClean="0"/>
+              <a:pPr>
+                <a:defRPr/>
+              </a:pPr>
+              <a:t>2</a:t>
+            </a:fld>
+            <a:endParaRPr lang="de-DE" altLang="en-US"/>
+          </a:p>
+        </p:txBody>
+      </p:sp>
+      <p:sp>
+        <p:nvSpPr>
+          <p:cNvPr id="7" name="TextBox 6"/>
+          <p:cNvSpPr txBox="1"/>
+          <p:nvPr/>
+        </p:nvSpPr>
+        <p:spPr>
+          <a:xfrm>
+            <a:off x="792821" y="2469083"/>
+            <a:ext cx="7879080" cy="2308324"/>
+          </a:xfrm>
+          <a:prstGeom prst="rect">
+            <a:avLst/>
+          </a:prstGeom>
+          <a:noFill/>
+        </p:spPr>
+        <p:txBody>
+          <a:bodyPr wrap="none" rtlCol="0">
+            <a:spAutoFit/>
+          </a:bodyPr>
+          <a:lstStyle/>
+          <a:p>
+            <a:r>
+              <a:rPr lang="de-DE" sz="2800" smtClean="0">
+                <a:solidFill>
+                  <a:srgbClr val="006600"/>
+                </a:solidFill>
+              </a:rPr>
+              <a:t>Greenfox</a:t>
+            </a:r>
+            <a:r>
+              <a:rPr lang="de-DE" sz="2800" smtClean="0"/>
+              <a:t> is a language for validating </a:t>
+            </a:r>
+          </a:p>
+          <a:p>
+            <a:r>
+              <a:rPr lang="de-DE" sz="2800" smtClean="0"/>
+              <a:t>file system trees* against a set of conditions.</a:t>
+            </a:r>
+          </a:p>
+          <a:p>
+            <a:endParaRPr lang="de-DE" sz="2800" smtClean="0"/>
+          </a:p>
+          <a:p>
+            <a:endParaRPr lang="de-DE" sz="2000" b="0" i="1" smtClean="0"/>
+          </a:p>
+          <a:p>
+            <a:r>
+              <a:rPr lang="de-DE" sz="2000" b="0" i="1"/>
+              <a:t> </a:t>
+            </a:r>
+            <a:r>
+              <a:rPr lang="de-DE" sz="2000" b="0" i="1" smtClean="0"/>
+              <a:t>                                *file system tree =  </a:t>
+            </a:r>
+          </a:p>
+          <a:p>
+            <a:r>
+              <a:rPr lang="de-DE" sz="2000" b="0" i="1" smtClean="0"/>
+              <a:t>   a folder + all folders and files directly or indirectly contained</a:t>
+            </a:r>
+          </a:p>
+        </p:txBody>
+      </p:sp>
+    </p:spTree>
+    <p:extLst>
+      <p:ext uri="{BB962C8B-B14F-4D97-AF65-F5344CB8AC3E}">
+        <p14:creationId xmlns:p14="http://schemas.microsoft.com/office/powerpoint/2010/main" val="2241998578"/>
+      </p:ext>
+    </p:extLst>
+  </p:cSld>
+  <p:clrMapOvr>
+    <a:masterClrMapping/>
+  </p:clrMapOvr>
+  <p:timing>
+    <p:tnLst>
+      <p:par>
+        <p:cTn id="1" dur="indefinite" restart="never" nodeType="tmRoot"/>
+      </p:par>
+    </p:tnLst>
+  </p:timing>
+</p:sld>
+</file>
+
+<file path=ppt/slides/slide20.xml><?xml version="1.0" encoding="utf-8"?>
+<p:sld xmlns:a="http://schemas.openxmlformats.org/drawingml/2006/main" xmlns:r="http://schemas.openxmlformats.org/officeDocument/2006/relationships" xmlns:p="http://schemas.openxmlformats.org/presentationml/2006/main">
+  <p:cSld>
+    <p:spTree>
+      <p:nvGrpSpPr>
+        <p:cNvPr id="1" name=""/>
+        <p:cNvGrpSpPr/>
+        <p:nvPr/>
+      </p:nvGrpSpPr>
+      <p:grpSpPr>
+        <a:xfrm>
+          <a:off x="0" y="0"/>
+          <a:ext cx="0" cy="0"/>
+          <a:chOff x="0" y="0"/>
+          <a:chExt cx="0" cy="0"/>
+        </a:xfrm>
+      </p:grpSpPr>
+      <p:sp>
+        <p:nvSpPr>
+          <p:cNvPr id="2" name="Title 1"/>
+          <p:cNvSpPr>
+            <a:spLocks noGrp="1"/>
+          </p:cNvSpPr>
+          <p:nvPr>
+            <p:ph type="title"/>
+          </p:nvPr>
+        </p:nvSpPr>
+        <p:spPr/>
+        <p:txBody>
+          <a:bodyPr/>
+          <a:lstStyle/>
+          <a:p>
+            <a:r>
+              <a:rPr lang="de-DE" smtClean="0"/>
+              <a:t>Constraint componets</a:t>
+            </a:r>
+            <a:br>
+              <a:rPr lang="de-DE" smtClean="0"/>
+            </a:br>
+            <a:r>
+              <a:rPr lang="de-DE"/>
+              <a:t> </a:t>
+            </a:r>
+            <a:r>
+              <a:rPr lang="de-DE" smtClean="0"/>
+              <a:t>  usable in value shapes</a:t>
+            </a:r>
+            <a:endParaRPr lang="de-DE"/>
+          </a:p>
+        </p:txBody>
+      </p:sp>
+      <p:sp>
+        <p:nvSpPr>
+          <p:cNvPr id="4" name="Date Placeholder 3"/>
+          <p:cNvSpPr>
+            <a:spLocks noGrp="1"/>
+          </p:cNvSpPr>
+          <p:nvPr>
+            <p:ph type="dt" sz="half" idx="10"/>
+          </p:nvPr>
+        </p:nvSpPr>
+        <p:spPr/>
+        <p:txBody>
+          <a:bodyPr/>
+          <a:lstStyle/>
+          <a:p>
+            <a:pPr>
+              <a:defRPr/>
+            </a:pPr>
+            <a:r>
+              <a:rPr lang="de-DE" altLang="de-DE" smtClean="0"/>
+              <a:t>2020-02-15</a:t>
+            </a:r>
+            <a:endParaRPr lang="de-DE" altLang="en-US"/>
+          </a:p>
+        </p:txBody>
+      </p:sp>
+      <p:sp>
+        <p:nvSpPr>
+          <p:cNvPr id="5" name="Footer Placeholder 4"/>
+          <p:cNvSpPr>
+            <a:spLocks noGrp="1"/>
+          </p:cNvSpPr>
+          <p:nvPr>
+            <p:ph type="ftr" sz="quarter" idx="11"/>
+          </p:nvPr>
+        </p:nvSpPr>
+        <p:spPr/>
+        <p:txBody>
+          <a:bodyPr/>
+          <a:lstStyle/>
+          <a:p>
+            <a:pPr>
+              <a:defRPr/>
+            </a:pPr>
+            <a:r>
+              <a:rPr lang="de-DE" altLang="en-US" smtClean="0"/>
+              <a:t>Greenfox</a:t>
+            </a:r>
+            <a:endParaRPr lang="de-DE" altLang="en-US"/>
+          </a:p>
+        </p:txBody>
+      </p:sp>
+      <p:sp>
+        <p:nvSpPr>
+          <p:cNvPr id="6" name="Slide Number Placeholder 5"/>
+          <p:cNvSpPr>
+            <a:spLocks noGrp="1"/>
+          </p:cNvSpPr>
+          <p:nvPr>
+            <p:ph type="sldNum" sz="quarter" idx="12"/>
+          </p:nvPr>
+        </p:nvSpPr>
+        <p:spPr/>
+        <p:txBody>
+          <a:bodyPr/>
+          <a:lstStyle/>
+          <a:p>
+            <a:pPr>
+              <a:defRPr/>
+            </a:pPr>
+            <a:fld id="{F031B2F4-27D1-4E53-97CF-1947CD75B185}" type="slidenum">
+              <a:rPr lang="de-DE" altLang="en-US" smtClean="0"/>
+              <a:pPr>
+                <a:defRPr/>
+              </a:pPr>
+              <a:t>20</a:t>
+            </a:fld>
+            <a:endParaRPr lang="de-DE" altLang="en-US"/>
+          </a:p>
+        </p:txBody>
+      </p:sp>
+      <p:sp>
+        <p:nvSpPr>
+          <p:cNvPr id="7" name="TextBox 6"/>
+          <p:cNvSpPr txBox="1"/>
+          <p:nvPr/>
+        </p:nvSpPr>
+        <p:spPr>
+          <a:xfrm>
+            <a:off x="457200" y="1556792"/>
+            <a:ext cx="8180445" cy="4708981"/>
+          </a:xfrm>
+          <a:prstGeom prst="rect">
+            <a:avLst/>
+          </a:prstGeom>
+          <a:noFill/>
+        </p:spPr>
+        <p:txBody>
+          <a:bodyPr wrap="none" rtlCol="0">
+            <a:spAutoFit/>
+          </a:bodyPr>
+          <a:lstStyle/>
+          <a:p>
+            <a:r>
+              <a:rPr lang="de-DE" sz="2000" smtClean="0">
+                <a:solidFill>
+                  <a:srgbClr val="0070C0"/>
+                </a:solidFill>
+              </a:rPr>
+              <a:t>No parameters</a:t>
+            </a:r>
+          </a:p>
+          <a:p>
+            <a:r>
+              <a:rPr lang="de-DE" sz="2000" smtClean="0"/>
+              <a:t>  empty exists itemsUnitue</a:t>
+            </a:r>
+          </a:p>
+          <a:p>
+            <a:endParaRPr lang="de-DE" sz="2000" smtClean="0"/>
+          </a:p>
+          <a:p>
+            <a:r>
+              <a:rPr lang="de-DE" sz="2000" smtClean="0">
+                <a:solidFill>
+                  <a:srgbClr val="0070C0"/>
+                </a:solidFill>
+              </a:rPr>
+              <a:t>Literal parameters</a:t>
+            </a:r>
+          </a:p>
+          <a:p>
+            <a:r>
+              <a:rPr lang="de-DE" sz="2000" smtClean="0"/>
+              <a:t>  count minCount maxCount</a:t>
+            </a:r>
+          </a:p>
+          <a:p>
+            <a:r>
+              <a:rPr lang="de-DE" sz="2000" smtClean="0"/>
+              <a:t>  datatype</a:t>
+            </a:r>
+            <a:endParaRPr lang="de-DE" sz="2000"/>
+          </a:p>
+          <a:p>
+            <a:r>
+              <a:rPr lang="de-DE" sz="2000" smtClean="0"/>
+              <a:t>  eq ne gt ge lt le</a:t>
+            </a:r>
+          </a:p>
+          <a:p>
+            <a:r>
+              <a:rPr lang="de-DE" sz="2000" smtClean="0"/>
+              <a:t>  matches notMatches</a:t>
+            </a:r>
+          </a:p>
+          <a:p>
+            <a:r>
+              <a:rPr lang="de-DE" sz="2000" smtClean="0"/>
+              <a:t>  like notLike</a:t>
+            </a:r>
+          </a:p>
+          <a:p>
+            <a:endParaRPr lang="de-DE" sz="2000"/>
+          </a:p>
+          <a:p>
+            <a:r>
+              <a:rPr lang="de-DE" sz="2000" smtClean="0">
+                <a:solidFill>
+                  <a:srgbClr val="0070C0"/>
+                </a:solidFill>
+              </a:rPr>
+              <a:t>Expression valued parameters</a:t>
+            </a:r>
+          </a:p>
+          <a:p>
+            <a:r>
+              <a:rPr lang="de-DE" sz="2000" smtClean="0"/>
+              <a:t>  eqFoxpath neFoxpath ltFoxpath leFoxpath gtFoxpath geFoxpath</a:t>
+            </a:r>
+          </a:p>
+          <a:p>
+            <a:r>
+              <a:rPr lang="de-DE" sz="2000" smtClean="0"/>
+              <a:t>  eqXPath </a:t>
+            </a:r>
+            <a:r>
+              <a:rPr lang="de-DE" sz="2000"/>
+              <a:t>neXPath ltXPath leXPath gtXPath geXPath</a:t>
+            </a:r>
+          </a:p>
+          <a:p>
+            <a:r>
+              <a:rPr lang="de-DE" sz="2000" smtClean="0"/>
+              <a:t>  inFoxpath containsFoxpath</a:t>
+            </a:r>
+          </a:p>
+          <a:p>
+            <a:r>
+              <a:rPr lang="de-DE" sz="2000" smtClean="0"/>
+              <a:t>  inXPath containsXPath</a:t>
+            </a:r>
+            <a:endParaRPr lang="de-DE" sz="2000"/>
+          </a:p>
+        </p:txBody>
+      </p:sp>
+    </p:spTree>
+    <p:extLst>
+      <p:ext uri="{BB962C8B-B14F-4D97-AF65-F5344CB8AC3E}">
+        <p14:creationId xmlns:p14="http://schemas.microsoft.com/office/powerpoint/2010/main" val="2675809795"/>
+      </p:ext>
+    </p:extLst>
+  </p:cSld>
+  <p:clrMapOvr>
+    <a:masterClrMapping/>
+  </p:clrMapOvr>
+</p:sld>
+</file>
+
+<file path=ppt/slides/slide21.xml><?xml version="1.0" encoding="utf-8"?>
 <p:sld xmlns:a="http://schemas.openxmlformats.org/drawingml/2006/main" xmlns:r="http://schemas.openxmlformats.org/officeDocument/2006/relationships" xmlns:p="http://schemas.openxmlformats.org/presentationml/2006/main">
   <p:cSld>
     <p:spTree>
@@ -24300,7 +24783,7 @@
               <a:pPr>
                 <a:defRPr/>
               </a:pPr>
-              <a:t>19</a:t>
+              <a:t>21</a:t>
             </a:fld>
             <a:endParaRPr lang="de-DE" altLang="en-US"/>
           </a:p>
@@ -24326,7 +24809,7 @@
 </p:sld>
 </file>
 
-<file path=ppt/slides/slide2.xml><?xml version="1.0" encoding="utf-8"?>
+<file path=ppt/slides/slide22.xml><?xml version="1.0" encoding="utf-8"?>
 <p:sld xmlns:a="http://schemas.openxmlformats.org/drawingml/2006/main" xmlns:r="http://schemas.openxmlformats.org/officeDocument/2006/relationships" xmlns:p="http://schemas.openxmlformats.org/presentationml/2006/main">
   <p:cSld>
     <p:spTree>
@@ -24360,9 +24843,20 @@
           <a:p>
             <a:r>
               <a:rPr lang="de-DE" smtClean="0"/>
-              <a:t>Greenfox: definition</a:t>
-            </a:r>
-            <a:endParaRPr lang="de-DE"/>
+              <a:t>Example: </a:t>
+            </a:r>
+            <a:br>
+              <a:rPr lang="de-DE" smtClean="0"/>
+            </a:br>
+            <a:r>
+              <a:rPr lang="de-DE"/>
+              <a:t> </a:t>
+            </a:r>
+            <a:r>
+              <a:rPr lang="de-DE" smtClean="0"/>
+              <a:t>  folder resource values</a:t>
+            </a:r>
+            <a:endParaRPr lang="de-DE" i="1"/>
           </a:p>
         </p:txBody>
       </p:sp>
@@ -24441,224 +24935,7 @@
               <a:pPr>
                 <a:defRPr/>
               </a:pPr>
-              <a:t>2</a:t>
-            </a:fld>
-            <a:endParaRPr lang="de-DE" altLang="en-US"/>
-          </a:p>
-        </p:txBody>
-      </p:sp>
-      <p:sp>
-        <p:nvSpPr>
-          <p:cNvPr id="7" name="TextBox 6"/>
-          <p:cNvSpPr txBox="1"/>
-          <p:nvPr/>
-        </p:nvSpPr>
-        <p:spPr>
-          <a:xfrm>
-            <a:off x="792821" y="2469083"/>
-            <a:ext cx="7879080" cy="2308324"/>
-          </a:xfrm>
-          <a:prstGeom prst="rect">
-            <a:avLst/>
-          </a:prstGeom>
-          <a:noFill/>
-        </p:spPr>
-        <p:txBody>
-          <a:bodyPr wrap="none" rtlCol="0">
-            <a:spAutoFit/>
-          </a:bodyPr>
-          <a:lstStyle/>
-          <a:p>
-            <a:r>
-              <a:rPr lang="de-DE" sz="2800" smtClean="0">
-                <a:solidFill>
-                  <a:srgbClr val="006600"/>
-                </a:solidFill>
-              </a:rPr>
-              <a:t>Greenfox</a:t>
-            </a:r>
-            <a:r>
-              <a:rPr lang="de-DE" sz="2800" smtClean="0"/>
-              <a:t> is a language for validating </a:t>
-            </a:r>
-          </a:p>
-          <a:p>
-            <a:r>
-              <a:rPr lang="de-DE" sz="2800" smtClean="0"/>
-              <a:t>file system trees* against a set of conditions.</a:t>
-            </a:r>
-          </a:p>
-          <a:p>
-            <a:endParaRPr lang="de-DE" sz="2800" smtClean="0"/>
-          </a:p>
-          <a:p>
-            <a:endParaRPr lang="de-DE" sz="2000" b="0" i="1" smtClean="0"/>
-          </a:p>
-          <a:p>
-            <a:r>
-              <a:rPr lang="de-DE" sz="2000" b="0" i="1"/>
-              <a:t> </a:t>
-            </a:r>
-            <a:r>
-              <a:rPr lang="de-DE" sz="2000" b="0" i="1" smtClean="0"/>
-              <a:t>                                *file system tree =  </a:t>
-            </a:r>
-          </a:p>
-          <a:p>
-            <a:r>
-              <a:rPr lang="de-DE" sz="2000" b="0" i="1" smtClean="0"/>
-              <a:t>   a folder + all folders and files directly or indirectly contained</a:t>
-            </a:r>
-          </a:p>
-        </p:txBody>
-      </p:sp>
-    </p:spTree>
-    <p:extLst>
-      <p:ext uri="{BB962C8B-B14F-4D97-AF65-F5344CB8AC3E}">
-        <p14:creationId xmlns:p14="http://schemas.microsoft.com/office/powerpoint/2010/main" val="2241998578"/>
-      </p:ext>
-    </p:extLst>
-  </p:cSld>
-  <p:clrMapOvr>
-    <a:masterClrMapping/>
-  </p:clrMapOvr>
-  <p:timing>
-    <p:tnLst>
-      <p:par>
-        <p:cTn id="1" dur="indefinite" restart="never" nodeType="tmRoot"/>
-      </p:par>
-    </p:tnLst>
-  </p:timing>
-</p:sld>
-</file>
-
-<file path=ppt/slides/slide20.xml><?xml version="1.0" encoding="utf-8"?>
-<p:sld xmlns:a="http://schemas.openxmlformats.org/drawingml/2006/main" xmlns:r="http://schemas.openxmlformats.org/officeDocument/2006/relationships" xmlns:p="http://schemas.openxmlformats.org/presentationml/2006/main">
-  <p:cSld>
-    <p:spTree>
-      <p:nvGrpSpPr>
-        <p:cNvPr id="1" name=""/>
-        <p:cNvGrpSpPr/>
-        <p:nvPr/>
-      </p:nvGrpSpPr>
-      <p:grpSpPr>
-        <a:xfrm>
-          <a:off x="0" y="0"/>
-          <a:ext cx="0" cy="0"/>
-          <a:chOff x="0" y="0"/>
-          <a:chExt cx="0" cy="0"/>
-        </a:xfrm>
-      </p:grpSpPr>
-      <p:sp>
-        <p:nvSpPr>
-          <p:cNvPr id="2" name="Title 1"/>
-          <p:cNvSpPr>
-            <a:spLocks noGrp="1"/>
-          </p:cNvSpPr>
-          <p:nvPr>
-            <p:ph type="title"/>
-          </p:nvPr>
-        </p:nvSpPr>
-        <p:spPr/>
-        <p:txBody>
-          <a:bodyPr/>
-          <a:lstStyle/>
-          <a:p>
-            <a:r>
-              <a:rPr lang="de-DE" smtClean="0"/>
-              <a:t>Example: </a:t>
-            </a:r>
-            <a:br>
-              <a:rPr lang="de-DE" smtClean="0"/>
-            </a:br>
-            <a:r>
-              <a:rPr lang="de-DE"/>
-              <a:t> </a:t>
-            </a:r>
-            <a:r>
-              <a:rPr lang="de-DE" smtClean="0"/>
-              <a:t>  folder resource values</a:t>
-            </a:r>
-            <a:endParaRPr lang="de-DE" i="1"/>
-          </a:p>
-        </p:txBody>
-      </p:sp>
-      <p:sp>
-        <p:nvSpPr>
-          <p:cNvPr id="4" name="Date Placeholder 3"/>
-          <p:cNvSpPr>
-            <a:spLocks noGrp="1"/>
-          </p:cNvSpPr>
-          <p:nvPr>
-            <p:ph type="dt" sz="half" idx="10"/>
-          </p:nvPr>
-        </p:nvSpPr>
-        <p:spPr/>
-        <p:txBody>
-          <a:bodyPr/>
-          <a:lstStyle/>
-          <a:p>
-            <a:pPr>
-              <a:defRPr/>
-            </a:pPr>
-            <a:r>
-              <a:rPr lang="de-DE" altLang="de-DE" smtClean="0"/>
-              <a:t>2020-02-15</a:t>
-            </a:r>
-            <a:endParaRPr lang="de-DE" altLang="en-US"/>
-          </a:p>
-        </p:txBody>
-      </p:sp>
-      <p:sp>
-        <p:nvSpPr>
-          <p:cNvPr id="5" name="Footer Placeholder 4"/>
-          <p:cNvSpPr>
-            <a:spLocks noGrp="1"/>
-          </p:cNvSpPr>
-          <p:nvPr>
-            <p:ph type="ftr" sz="quarter" idx="11"/>
-          </p:nvPr>
-        </p:nvSpPr>
-        <p:spPr/>
-        <p:txBody>
-          <a:bodyPr/>
-          <a:lstStyle/>
-          <a:p>
-            <a:pPr>
-              <a:defRPr/>
-            </a:pPr>
-            <a:r>
-              <a:rPr lang="de-DE" altLang="en-US" smtClean="0"/>
-              <a:t>Greenfox</a:t>
-            </a:r>
-            <a:endParaRPr lang="de-DE" altLang="en-US"/>
-          </a:p>
-        </p:txBody>
-      </p:sp>
-      <p:sp>
-        <p:nvSpPr>
-          <p:cNvPr id="6" name="Slide Number Placeholder 5"/>
-          <p:cNvSpPr>
-            <a:spLocks noGrp="1"/>
-          </p:cNvSpPr>
-          <p:nvPr>
-            <p:ph type="sldNum" sz="quarter" idx="12"/>
-          </p:nvPr>
-        </p:nvSpPr>
-        <p:spPr/>
-        <p:txBody>
-          <a:bodyPr/>
-          <a:lstStyle/>
-          <a:p>
-            <a:pPr>
-              <a:defRPr/>
-            </a:pPr>
-            <a:fld id="{F031B2F4-27D1-4E53-97CF-1947CD75B185}" type="slidenum">
-              <a:rPr lang="de-DE" altLang="en-US" smtClean="0"/>
-              <a:pPr>
-                <a:defRPr/>
-              </a:pPr>
-              <a:t>20</a:t>
+              <a:t>22</a:t>
             </a:fld>
             <a:endParaRPr lang="de-DE" altLang="en-US"/>
           </a:p>
@@ -25617,7 +25894,7 @@
 </p:sld>
 </file>
 
-<file path=ppt/slides/slide21.xml><?xml version="1.0" encoding="utf-8"?>
+<file path=ppt/slides/slide23.xml><?xml version="1.0" encoding="utf-8"?>
 <p:sld xmlns:a="http://schemas.openxmlformats.org/drawingml/2006/main" xmlns:r="http://schemas.openxmlformats.org/officeDocument/2006/relationships" xmlns:p="http://schemas.openxmlformats.org/presentationml/2006/main">
   <p:cSld>
     <p:spTree>
@@ -25743,7 +26020,7 @@
               <a:pPr>
                 <a:defRPr/>
               </a:pPr>
-              <a:t>21</a:t>
+              <a:t>23</a:t>
             </a:fld>
             <a:endParaRPr lang="de-DE" altLang="en-US"/>
           </a:p>
@@ -26179,7 +26456,7 @@
 </p:sld>
 </file>
 
-<file path=ppt/slides/slide22.xml><?xml version="1.0" encoding="utf-8"?>
+<file path=ppt/slides/slide24.xml><?xml version="1.0" encoding="utf-8"?>
 <p:sld xmlns:a="http://schemas.openxmlformats.org/drawingml/2006/main" xmlns:r="http://schemas.openxmlformats.org/officeDocument/2006/relationships" xmlns:p="http://schemas.openxmlformats.org/presentationml/2006/main">
   <p:cSld>
     <p:spTree>
@@ -26305,7 +26582,7 @@
               <a:pPr>
                 <a:defRPr/>
               </a:pPr>
-              <a:t>22</a:t>
+              <a:t>24</a:t>
             </a:fld>
             <a:endParaRPr lang="de-DE" altLang="en-US"/>
           </a:p>
@@ -26627,7 +26904,7 @@
 </p:sld>
 </file>
 
-<file path=ppt/slides/slide23.xml><?xml version="1.0" encoding="utf-8"?>
+<file path=ppt/slides/slide25.xml><?xml version="1.0" encoding="utf-8"?>
 <p:sld xmlns:a="http://schemas.openxmlformats.org/drawingml/2006/main" xmlns:r="http://schemas.openxmlformats.org/officeDocument/2006/relationships" xmlns:p="http://schemas.openxmlformats.org/presentationml/2006/main">
   <p:cSld>
     <p:spTree>
@@ -26742,7 +27019,7 @@
               <a:pPr>
                 <a:defRPr/>
               </a:pPr>
-              <a:t>23</a:t>
+              <a:t>25</a:t>
             </a:fld>
             <a:endParaRPr lang="de-DE" altLang="en-US"/>
           </a:p>
@@ -27640,7 +27917,7 @@
 </p:sld>
 </file>
 
-<file path=ppt/slides/slide24.xml><?xml version="1.0" encoding="utf-8"?>
+<file path=ppt/slides/slide26.xml><?xml version="1.0" encoding="utf-8"?>
 <p:sld xmlns:a="http://schemas.openxmlformats.org/drawingml/2006/main" xmlns:r="http://schemas.openxmlformats.org/officeDocument/2006/relationships" xmlns:p="http://schemas.openxmlformats.org/presentationml/2006/main">
   <p:cSld>
     <p:spTree>
@@ -27862,7 +28139,7 @@
               <a:pPr>
                 <a:defRPr/>
               </a:pPr>
-              <a:t>24</a:t>
+              <a:t>26</a:t>
             </a:fld>
             <a:endParaRPr lang="de-DE" altLang="en-US"/>
           </a:p>
@@ -28614,7 +28891,7 @@
 </p:sld>
 </file>
 
-<file path=ppt/slides/slide25.xml><?xml version="1.0" encoding="utf-8"?>
+<file path=ppt/slides/slide27.xml><?xml version="1.0" encoding="utf-8"?>
 <p:sld xmlns:a="http://schemas.openxmlformats.org/drawingml/2006/main" xmlns:r="http://schemas.openxmlformats.org/officeDocument/2006/relationships" xmlns:p="http://schemas.openxmlformats.org/presentationml/2006/main">
   <p:cSld>
     <p:spTree>
@@ -28737,7 +29014,7 @@
               <a:pPr>
                 <a:defRPr/>
               </a:pPr>
-              <a:t>25</a:t>
+              <a:t>27</a:t>
             </a:fld>
             <a:endParaRPr lang="de-DE" altLang="en-US"/>
           </a:p>
@@ -29669,489 +29946,6 @@
 </p:sld>
 </file>
 
-<file path=ppt/slides/slide26.xml><?xml version="1.0" encoding="utf-8"?>
-<p:sld xmlns:a="http://schemas.openxmlformats.org/drawingml/2006/main" xmlns:r="http://schemas.openxmlformats.org/officeDocument/2006/relationships" xmlns:p="http://schemas.openxmlformats.org/presentationml/2006/main">
-  <p:cSld>
-    <p:spTree>
-      <p:nvGrpSpPr>
-        <p:cNvPr id="1" name=""/>
-        <p:cNvGrpSpPr/>
-        <p:nvPr/>
-      </p:nvGrpSpPr>
-      <p:grpSpPr>
-        <a:xfrm>
-          <a:off x="0" y="0"/>
-          <a:ext cx="0" cy="0"/>
-          <a:chOff x="0" y="0"/>
-          <a:chExt cx="0" cy="0"/>
-        </a:xfrm>
-      </p:grpSpPr>
-      <p:sp>
-        <p:nvSpPr>
-          <p:cNvPr id="2" name="Title 1"/>
-          <p:cNvSpPr>
-            <a:spLocks noGrp="1"/>
-          </p:cNvSpPr>
-          <p:nvPr>
-            <p:ph type="title"/>
-          </p:nvPr>
-        </p:nvSpPr>
-        <p:spPr/>
-        <p:txBody>
-          <a:bodyPr/>
-          <a:lstStyle/>
-          <a:p>
-            <a:r>
-              <a:rPr lang="de-DE" smtClean="0">
-                <a:solidFill>
-                  <a:srgbClr val="006600"/>
-                </a:solidFill>
-              </a:rPr>
-              <a:t>Implementation</a:t>
-            </a:r>
-            <a:endParaRPr lang="de-DE">
-              <a:solidFill>
-                <a:srgbClr val="006600"/>
-              </a:solidFill>
-            </a:endParaRPr>
-          </a:p>
-        </p:txBody>
-      </p:sp>
-      <p:sp>
-        <p:nvSpPr>
-          <p:cNvPr id="3" name="Content Placeholder 2"/>
-          <p:cNvSpPr>
-            <a:spLocks noGrp="1"/>
-          </p:cNvSpPr>
-          <p:nvPr>
-            <p:ph idx="1"/>
-          </p:nvPr>
-        </p:nvSpPr>
-        <p:spPr/>
-        <p:txBody>
-          <a:bodyPr/>
-          <a:lstStyle/>
-          <a:p>
-            <a:endParaRPr lang="de-DE"/>
-          </a:p>
-        </p:txBody>
-      </p:sp>
-      <p:sp>
-        <p:nvSpPr>
-          <p:cNvPr id="4" name="Date Placeholder 3"/>
-          <p:cNvSpPr>
-            <a:spLocks noGrp="1"/>
-          </p:cNvSpPr>
-          <p:nvPr>
-            <p:ph type="dt" sz="half" idx="10"/>
-          </p:nvPr>
-        </p:nvSpPr>
-        <p:spPr/>
-        <p:txBody>
-          <a:bodyPr/>
-          <a:lstStyle/>
-          <a:p>
-            <a:pPr>
-              <a:defRPr/>
-            </a:pPr>
-            <a:r>
-              <a:rPr lang="de-DE" altLang="de-DE" smtClean="0"/>
-              <a:t>2020-02-15</a:t>
-            </a:r>
-            <a:endParaRPr lang="de-DE" altLang="en-US"/>
-          </a:p>
-        </p:txBody>
-      </p:sp>
-      <p:sp>
-        <p:nvSpPr>
-          <p:cNvPr id="5" name="Footer Placeholder 4"/>
-          <p:cNvSpPr>
-            <a:spLocks noGrp="1"/>
-          </p:cNvSpPr>
-          <p:nvPr>
-            <p:ph type="ftr" sz="quarter" idx="11"/>
-          </p:nvPr>
-        </p:nvSpPr>
-        <p:spPr/>
-        <p:txBody>
-          <a:bodyPr/>
-          <a:lstStyle/>
-          <a:p>
-            <a:pPr>
-              <a:defRPr/>
-            </a:pPr>
-            <a:r>
-              <a:rPr lang="de-DE" altLang="en-US" smtClean="0"/>
-              <a:t>Greenfox</a:t>
-            </a:r>
-            <a:endParaRPr lang="de-DE" altLang="en-US"/>
-          </a:p>
-        </p:txBody>
-      </p:sp>
-      <p:sp>
-        <p:nvSpPr>
-          <p:cNvPr id="6" name="Slide Number Placeholder 5"/>
-          <p:cNvSpPr>
-            <a:spLocks noGrp="1"/>
-          </p:cNvSpPr>
-          <p:nvPr>
-            <p:ph type="sldNum" sz="quarter" idx="12"/>
-          </p:nvPr>
-        </p:nvSpPr>
-        <p:spPr/>
-        <p:txBody>
-          <a:bodyPr/>
-          <a:lstStyle/>
-          <a:p>
-            <a:pPr>
-              <a:defRPr/>
-            </a:pPr>
-            <a:fld id="{F031B2F4-27D1-4E53-97CF-1947CD75B185}" type="slidenum">
-              <a:rPr lang="de-DE" altLang="en-US" smtClean="0"/>
-              <a:pPr>
-                <a:defRPr/>
-              </a:pPr>
-              <a:t>26</a:t>
-            </a:fld>
-            <a:endParaRPr lang="de-DE" altLang="en-US"/>
-          </a:p>
-        </p:txBody>
-      </p:sp>
-      <p:sp>
-        <p:nvSpPr>
-          <p:cNvPr id="7" name="TextBox 6"/>
-          <p:cNvSpPr txBox="1"/>
-          <p:nvPr/>
-        </p:nvSpPr>
-        <p:spPr>
-          <a:xfrm>
-            <a:off x="457200" y="2636912"/>
-            <a:ext cx="8238153" cy="646331"/>
-          </a:xfrm>
-          <a:prstGeom prst="rect">
-            <a:avLst/>
-          </a:prstGeom>
-          <a:noFill/>
-        </p:spPr>
-        <p:txBody>
-          <a:bodyPr wrap="none" rtlCol="0">
-            <a:spAutoFit/>
-          </a:bodyPr>
-          <a:lstStyle/>
-          <a:p>
-            <a:r>
-              <a:rPr lang="de-DE" sz="3600" smtClean="0">
-                <a:solidFill>
-                  <a:srgbClr val="006600"/>
-                </a:solidFill>
-              </a:rPr>
-              <a:t>https://github.com/hrennau/greenfox</a:t>
-            </a:r>
-            <a:endParaRPr lang="de-DE" sz="3600">
-              <a:solidFill>
-                <a:srgbClr val="006600"/>
-              </a:solidFill>
-            </a:endParaRPr>
-          </a:p>
-        </p:txBody>
-      </p:sp>
-      <p:sp>
-        <p:nvSpPr>
-          <p:cNvPr id="8" name="TextBox 7"/>
-          <p:cNvSpPr txBox="1"/>
-          <p:nvPr/>
-        </p:nvSpPr>
-        <p:spPr>
-          <a:xfrm>
-            <a:off x="539552" y="5229200"/>
-            <a:ext cx="6066917" cy="646331"/>
-          </a:xfrm>
-          <a:prstGeom prst="rect">
-            <a:avLst/>
-          </a:prstGeom>
-          <a:noFill/>
-        </p:spPr>
-        <p:txBody>
-          <a:bodyPr wrap="none" rtlCol="0">
-            <a:spAutoFit/>
-          </a:bodyPr>
-          <a:lstStyle/>
-          <a:p>
-            <a:r>
-              <a:rPr lang="de-DE" smtClean="0">
-                <a:latin typeface="Arial Black" panose="020B0A04020102020204" pitchFamily="34" charset="0"/>
-              </a:rPr>
-              <a:t>Apologies for the incomplete documentation – </a:t>
-            </a:r>
-          </a:p>
-          <a:p>
-            <a:r>
-              <a:rPr lang="de-DE" smtClean="0">
-                <a:latin typeface="Arial Black" panose="020B0A04020102020204" pitchFamily="34" charset="0"/>
-              </a:rPr>
-              <a:t>extension under construction.</a:t>
-            </a:r>
-            <a:endParaRPr lang="de-DE">
-              <a:latin typeface="Arial Black" panose="020B0A04020102020204" pitchFamily="34" charset="0"/>
-            </a:endParaRPr>
-          </a:p>
-        </p:txBody>
-      </p:sp>
-    </p:spTree>
-    <p:extLst>
-      <p:ext uri="{BB962C8B-B14F-4D97-AF65-F5344CB8AC3E}">
-        <p14:creationId xmlns:p14="http://schemas.microsoft.com/office/powerpoint/2010/main" val="1291537303"/>
-      </p:ext>
-    </p:extLst>
-  </p:cSld>
-  <p:clrMapOvr>
-    <a:masterClrMapping/>
-  </p:clrMapOvr>
-  <p:timing>
-    <p:tnLst>
-      <p:par>
-        <p:cTn id="1" dur="indefinite" restart="never" nodeType="tmRoot"/>
-      </p:par>
-    </p:tnLst>
-  </p:timing>
-</p:sld>
-</file>
-
-<file path=ppt/slides/slide27.xml><?xml version="1.0" encoding="utf-8"?>
-<p:sld xmlns:a="http://schemas.openxmlformats.org/drawingml/2006/main" xmlns:r="http://schemas.openxmlformats.org/officeDocument/2006/relationships" xmlns:p="http://schemas.openxmlformats.org/presentationml/2006/main">
-  <p:cSld>
-    <p:spTree>
-      <p:nvGrpSpPr>
-        <p:cNvPr id="1" name=""/>
-        <p:cNvGrpSpPr/>
-        <p:nvPr/>
-      </p:nvGrpSpPr>
-      <p:grpSpPr>
-        <a:xfrm>
-          <a:off x="0" y="0"/>
-          <a:ext cx="0" cy="0"/>
-          <a:chOff x="0" y="0"/>
-          <a:chExt cx="0" cy="0"/>
-        </a:xfrm>
-      </p:grpSpPr>
-      <p:sp>
-        <p:nvSpPr>
-          <p:cNvPr id="2" name="Title 1"/>
-          <p:cNvSpPr>
-            <a:spLocks noGrp="1"/>
-          </p:cNvSpPr>
-          <p:nvPr>
-            <p:ph type="title"/>
-          </p:nvPr>
-        </p:nvSpPr>
-        <p:spPr/>
-        <p:txBody>
-          <a:bodyPr/>
-          <a:lstStyle/>
-          <a:p>
-            <a:r>
-              <a:rPr lang="de-DE" smtClean="0">
-                <a:solidFill>
-                  <a:srgbClr val="006600"/>
-                </a:solidFill>
-              </a:rPr>
-              <a:t>Greenfox – a summary</a:t>
-            </a:r>
-            <a:endParaRPr lang="de-DE">
-              <a:solidFill>
-                <a:srgbClr val="006600"/>
-              </a:solidFill>
-            </a:endParaRPr>
-          </a:p>
-        </p:txBody>
-      </p:sp>
-      <p:sp>
-        <p:nvSpPr>
-          <p:cNvPr id="3" name="Content Placeholder 2"/>
-          <p:cNvSpPr>
-            <a:spLocks noGrp="1"/>
-          </p:cNvSpPr>
-          <p:nvPr>
-            <p:ph idx="1"/>
-          </p:nvPr>
-        </p:nvSpPr>
-        <p:spPr>
-          <a:xfrm>
-            <a:off x="457200" y="1719263"/>
-            <a:ext cx="8686800" cy="4411662"/>
-          </a:xfrm>
-        </p:spPr>
-        <p:txBody>
-          <a:bodyPr/>
-          <a:lstStyle/>
-          <a:p>
-            <a:pPr lvl="1"/>
-            <a:r>
-              <a:rPr lang="de-DE" smtClean="0"/>
-              <a:t>Goal: validation of a file system tree</a:t>
-            </a:r>
-          </a:p>
-          <a:p>
-            <a:pPr lvl="1"/>
-            <a:r>
-              <a:rPr lang="de-DE" smtClean="0"/>
-              <a:t>Based on XDM</a:t>
-            </a:r>
-          </a:p>
-          <a:p>
-            <a:pPr lvl="1"/>
-            <a:r>
-              <a:rPr lang="de-DE" smtClean="0"/>
-              <a:t>Powered by XPath and foxpath</a:t>
-            </a:r>
-          </a:p>
-          <a:p>
-            <a:pPr lvl="1"/>
-            <a:r>
-              <a:rPr lang="de-DE" smtClean="0"/>
-              <a:t>Inspired by SHACL</a:t>
-            </a:r>
-          </a:p>
-          <a:p>
-            <a:pPr lvl="1"/>
-            <a:r>
-              <a:rPr lang="de-DE" smtClean="0">
-                <a:solidFill>
-                  <a:srgbClr val="CC6600"/>
-                </a:solidFill>
-              </a:rPr>
-              <a:t>Mediatypes hidden behind XDM node trees</a:t>
-            </a:r>
-          </a:p>
-          <a:p>
-            <a:pPr lvl="1"/>
-            <a:r>
-              <a:rPr lang="de-DE" smtClean="0">
-                <a:solidFill>
-                  <a:srgbClr val="CC6600"/>
-                </a:solidFill>
-              </a:rPr>
-              <a:t>Resource boundaries hidden by foxpath navigation</a:t>
-            </a:r>
-          </a:p>
-          <a:p>
-            <a:pPr lvl="1"/>
-            <a:r>
-              <a:rPr lang="de-DE" smtClean="0"/>
-              <a:t>Producing structured information</a:t>
-            </a:r>
-          </a:p>
-          <a:p>
-            <a:pPr lvl="1"/>
-            <a:r>
-              <a:rPr lang="de-DE" smtClean="0"/>
-              <a:t>Extensible</a:t>
-            </a:r>
-            <a:endParaRPr lang="de-DE"/>
-          </a:p>
-        </p:txBody>
-      </p:sp>
-      <p:sp>
-        <p:nvSpPr>
-          <p:cNvPr id="4" name="Date Placeholder 3"/>
-          <p:cNvSpPr>
-            <a:spLocks noGrp="1"/>
-          </p:cNvSpPr>
-          <p:nvPr>
-            <p:ph type="dt" sz="half" idx="10"/>
-          </p:nvPr>
-        </p:nvSpPr>
-        <p:spPr/>
-        <p:txBody>
-          <a:bodyPr/>
-          <a:lstStyle/>
-          <a:p>
-            <a:pPr>
-              <a:defRPr/>
-            </a:pPr>
-            <a:r>
-              <a:rPr lang="de-DE" altLang="de-DE" smtClean="0"/>
-              <a:t>2020-02-15</a:t>
-            </a:r>
-            <a:endParaRPr lang="de-DE" altLang="en-US"/>
-          </a:p>
-        </p:txBody>
-      </p:sp>
-      <p:sp>
-        <p:nvSpPr>
-          <p:cNvPr id="5" name="Footer Placeholder 4"/>
-          <p:cNvSpPr>
-            <a:spLocks noGrp="1"/>
-          </p:cNvSpPr>
-          <p:nvPr>
-            <p:ph type="ftr" sz="quarter" idx="11"/>
-          </p:nvPr>
-        </p:nvSpPr>
-        <p:spPr/>
-        <p:txBody>
-          <a:bodyPr/>
-          <a:lstStyle/>
-          <a:p>
-            <a:pPr>
-              <a:defRPr/>
-            </a:pPr>
-            <a:r>
-              <a:rPr lang="de-DE" altLang="en-US" smtClean="0"/>
-              <a:t>Greenfox</a:t>
-            </a:r>
-            <a:endParaRPr lang="de-DE" altLang="en-US"/>
-          </a:p>
-        </p:txBody>
-      </p:sp>
-      <p:sp>
-        <p:nvSpPr>
-          <p:cNvPr id="6" name="Slide Number Placeholder 5"/>
-          <p:cNvSpPr>
-            <a:spLocks noGrp="1"/>
-          </p:cNvSpPr>
-          <p:nvPr>
-            <p:ph type="sldNum" sz="quarter" idx="12"/>
-          </p:nvPr>
-        </p:nvSpPr>
-        <p:spPr/>
-        <p:txBody>
-          <a:bodyPr/>
-          <a:lstStyle/>
-          <a:p>
-            <a:pPr>
-              <a:defRPr/>
-            </a:pPr>
-            <a:fld id="{F031B2F4-27D1-4E53-97CF-1947CD75B185}" type="slidenum">
-              <a:rPr lang="de-DE" altLang="en-US" smtClean="0"/>
-              <a:pPr>
-                <a:defRPr/>
-              </a:pPr>
-              <a:t>27</a:t>
-            </a:fld>
-            <a:endParaRPr lang="de-DE" altLang="en-US"/>
-          </a:p>
-        </p:txBody>
-      </p:sp>
-    </p:spTree>
-    <p:extLst>
-      <p:ext uri="{BB962C8B-B14F-4D97-AF65-F5344CB8AC3E}">
-        <p14:creationId xmlns:p14="http://schemas.microsoft.com/office/powerpoint/2010/main" val="1033260497"/>
-      </p:ext>
-    </p:extLst>
-  </p:cSld>
-  <p:clrMapOvr>
-    <a:masterClrMapping/>
-  </p:clrMapOvr>
-  <p:timing>
-    <p:tnLst>
-      <p:par>
-        <p:cTn id="1" dur="indefinite" restart="never" nodeType="tmRoot"/>
-      </p:par>
-    </p:tnLst>
-  </p:timing>
-</p:sld>
-</file>
-
 <file path=ppt/slides/slide28.xml><?xml version="1.0" encoding="utf-8"?>
 <p:sld xmlns:a="http://schemas.openxmlformats.org/drawingml/2006/main" xmlns:r="http://schemas.openxmlformats.org/officeDocument/2006/relationships" xmlns:p="http://schemas.openxmlformats.org/presentationml/2006/main">
   <p:cSld>
@@ -30185,10 +29979,18 @@
           <a:lstStyle/>
           <a:p>
             <a:r>
-              <a:rPr lang="de-DE" smtClean="0"/>
-              <a:t>+</a:t>
-            </a:r>
-            <a:endParaRPr lang="de-DE"/>
+              <a:rPr lang="de-DE" smtClean="0">
+                <a:solidFill>
+                  <a:srgbClr val="006600"/>
+                </a:solidFill>
+              </a:rPr>
+              <a:t>Implementation</a:t>
+            </a:r>
+            <a:endParaRPr lang="de-DE">
+              <a:solidFill>
+                <a:srgbClr val="006600"/>
+              </a:solidFill>
+            </a:endParaRPr>
           </a:p>
         </p:txBody>
       </p:sp>
@@ -30300,8 +30102,8 @@
         </p:nvSpPr>
         <p:spPr>
           <a:xfrm>
-            <a:off x="3450622" y="3356992"/>
-            <a:ext cx="2345514" cy="584775"/>
+            <a:off x="457200" y="2636912"/>
+            <a:ext cx="8238153" cy="646331"/>
           </a:xfrm>
           <a:prstGeom prst="rect">
             <a:avLst/>
@@ -30315,14 +30117,14 @@
           <a:lstStyle/>
           <a:p>
             <a:r>
-              <a:rPr lang="de-DE" sz="3200" smtClean="0">
+              <a:rPr lang="de-DE" sz="3600" smtClean="0">
                 <a:solidFill>
                   <a:srgbClr val="006600"/>
                 </a:solidFill>
               </a:rPr>
-              <a:t>Thank you.</a:t>
-            </a:r>
-            <a:endParaRPr lang="de-DE" sz="3200">
+              <a:t>https://github.com/hrennau/greenfox</a:t>
+            </a:r>
+            <a:endParaRPr lang="de-DE" sz="3600">
               <a:solidFill>
                 <a:srgbClr val="006600"/>
               </a:solidFill>
@@ -30330,10 +30132,52 @@
           </a:p>
         </p:txBody>
       </p:sp>
+      <p:sp>
+        <p:nvSpPr>
+          <p:cNvPr id="8" name="TextBox 7"/>
+          <p:cNvSpPr txBox="1"/>
+          <p:nvPr/>
+        </p:nvSpPr>
+        <p:spPr>
+          <a:xfrm>
+            <a:off x="539552" y="5229200"/>
+            <a:ext cx="6066917" cy="646331"/>
+          </a:xfrm>
+          <a:prstGeom prst="rect">
+            <a:avLst/>
+          </a:prstGeom>
+          <a:noFill/>
+        </p:spPr>
+        <p:txBody>
+          <a:bodyPr wrap="none" rtlCol="0">
+            <a:spAutoFit/>
+          </a:bodyPr>
+          <a:lstStyle/>
+          <a:p>
+            <a:r>
+              <a:rPr lang="de-DE" smtClean="0">
+                <a:latin typeface="Arial Black" panose="020B0A04020102020204" pitchFamily="34" charset="0"/>
+              </a:rPr>
+              <a:t>Apologies for the incomplete documentation – </a:t>
+            </a:r>
+          </a:p>
+          <a:p>
+            <a:r>
+              <a:rPr lang="de-DE" smtClean="0">
+                <a:latin typeface="Arial Black" panose="020B0A04020102020204" pitchFamily="34" charset="0"/>
+              </a:rPr>
+              <a:t>extension under construction.</a:t>
+            </a:r>
+            <a:endParaRPr lang="de-DE">
+              <a:latin typeface="Arial Black" panose="020B0A04020102020204" pitchFamily="34" charset="0"/>
+            </a:endParaRPr>
+          </a:p>
+        </p:txBody>
+      </p:sp>
     </p:spTree>
     <p:extLst>
       <p:ext uri="{BB962C8B-B14F-4D97-AF65-F5344CB8AC3E}">
-        <p14:creationId xmlns:p14="http://schemas.microsoft.com/office/powerpoint/2010/main" val="1157495545"/>
+        <p14:creationId xmlns:p14="http://schemas.microsoft.com/office/powerpoint/2010/main" val="1291537303"/>
       </p:ext>
     </p:extLst>
   </p:cSld>
@@ -30383,8 +30227,102 @@
           <a:lstStyle/>
           <a:p>
             <a:r>
+              <a:rPr lang="de-DE" smtClean="0">
+                <a:solidFill>
+                  <a:srgbClr val="006600"/>
+                </a:solidFill>
+              </a:rPr>
+              <a:t>Greenfox – a summary</a:t>
+            </a:r>
+            <a:endParaRPr lang="de-DE">
+              <a:solidFill>
+                <a:srgbClr val="006600"/>
+              </a:solidFill>
+            </a:endParaRPr>
+          </a:p>
+        </p:txBody>
+      </p:sp>
+      <p:sp>
+        <p:nvSpPr>
+          <p:cNvPr id="3" name="Content Placeholder 2"/>
+          <p:cNvSpPr>
+            <a:spLocks noGrp="1"/>
+          </p:cNvSpPr>
+          <p:nvPr>
+            <p:ph idx="1"/>
+          </p:nvPr>
+        </p:nvSpPr>
+        <p:spPr>
+          <a:xfrm>
+            <a:off x="457200" y="1719263"/>
+            <a:ext cx="8686800" cy="4411662"/>
+          </a:xfrm>
+        </p:spPr>
+        <p:txBody>
+          <a:bodyPr/>
+          <a:lstStyle/>
+          <a:p>
+            <a:pPr lvl="1"/>
+            <a:r>
               <a:rPr lang="de-DE" smtClean="0"/>
-              <a:t>Cross-boundary navigation</a:t>
+              <a:t>Goal: validation of a file system tree</a:t>
+            </a:r>
+          </a:p>
+          <a:p>
+            <a:pPr lvl="1"/>
+            <a:r>
+              <a:rPr lang="de-DE" smtClean="0"/>
+              <a:t>Based on XDM</a:t>
+            </a:r>
+          </a:p>
+          <a:p>
+            <a:pPr lvl="1"/>
+            <a:r>
+              <a:rPr lang="de-DE" smtClean="0"/>
+              <a:t>Powered by XPath and foxpath</a:t>
+            </a:r>
+          </a:p>
+          <a:p>
+            <a:pPr lvl="1"/>
+            <a:r>
+              <a:rPr lang="de-DE" smtClean="0"/>
+              <a:t>Inspired by SHACL</a:t>
+            </a:r>
+          </a:p>
+          <a:p>
+            <a:pPr lvl="1"/>
+            <a:r>
+              <a:rPr lang="de-DE" smtClean="0">
+                <a:solidFill>
+                  <a:srgbClr val="CC6600"/>
+                </a:solidFill>
+              </a:rPr>
+              <a:t>Mediatypes hidden behind XDM node trees</a:t>
+            </a:r>
+          </a:p>
+          <a:p>
+            <a:pPr lvl="1"/>
+            <a:r>
+              <a:rPr lang="de-DE" smtClean="0">
+                <a:solidFill>
+                  <a:srgbClr val="CC6600"/>
+                </a:solidFill>
+              </a:rPr>
+              <a:t>Resource boundaries hidden by foxpath navigation</a:t>
+            </a:r>
+          </a:p>
+          <a:p>
+            <a:pPr lvl="1"/>
+            <a:r>
+              <a:rPr lang="de-DE" smtClean="0"/>
+              <a:t>Producing structured information</a:t>
+            </a:r>
+          </a:p>
+          <a:p>
+            <a:pPr lvl="1"/>
+            <a:r>
+              <a:rPr lang="de-DE" smtClean="0"/>
+              <a:t>Extensible</a:t>
             </a:r>
             <a:endParaRPr lang="de-DE"/>
           </a:p>
@@ -30466,6 +30404,521 @@
                 <a:defRPr/>
               </a:pPr>
               <a:t>29</a:t>
+            </a:fld>
+            <a:endParaRPr lang="de-DE" altLang="en-US"/>
+          </a:p>
+        </p:txBody>
+      </p:sp>
+    </p:spTree>
+    <p:extLst>
+      <p:ext uri="{BB962C8B-B14F-4D97-AF65-F5344CB8AC3E}">
+        <p14:creationId xmlns:p14="http://schemas.microsoft.com/office/powerpoint/2010/main" val="1033260497"/>
+      </p:ext>
+    </p:extLst>
+  </p:cSld>
+  <p:clrMapOvr>
+    <a:masterClrMapping/>
+  </p:clrMapOvr>
+  <p:timing>
+    <p:tnLst>
+      <p:par>
+        <p:cTn id="1" dur="indefinite" restart="never" nodeType="tmRoot"/>
+      </p:par>
+    </p:tnLst>
+  </p:timing>
+</p:sld>
+</file>
+
+<file path=ppt/slides/slide3.xml><?xml version="1.0" encoding="utf-8"?>
+<p:sld xmlns:a="http://schemas.openxmlformats.org/drawingml/2006/main" xmlns:r="http://schemas.openxmlformats.org/officeDocument/2006/relationships" xmlns:p="http://schemas.openxmlformats.org/presentationml/2006/main">
+  <p:cSld>
+    <p:spTree>
+      <p:nvGrpSpPr>
+        <p:cNvPr id="1" name=""/>
+        <p:cNvGrpSpPr/>
+        <p:nvPr/>
+      </p:nvGrpSpPr>
+      <p:grpSpPr>
+        <a:xfrm>
+          <a:off x="0" y="0"/>
+          <a:ext cx="0" cy="0"/>
+          <a:chOff x="0" y="0"/>
+          <a:chExt cx="0" cy="0"/>
+        </a:xfrm>
+      </p:grpSpPr>
+      <p:sp>
+        <p:nvSpPr>
+          <p:cNvPr id="2" name="Title 1"/>
+          <p:cNvSpPr>
+            <a:spLocks noGrp="1"/>
+          </p:cNvSpPr>
+          <p:nvPr>
+            <p:ph type="title"/>
+          </p:nvPr>
+        </p:nvSpPr>
+        <p:spPr/>
+        <p:txBody>
+          <a:bodyPr/>
+          <a:lstStyle/>
+          <a:p>
+            <a:r>
+              <a:rPr lang="de-DE" smtClean="0"/>
+              <a:t>File system validation</a:t>
+            </a:r>
+            <a:endParaRPr lang="de-DE"/>
+          </a:p>
+        </p:txBody>
+      </p:sp>
+      <p:sp>
+        <p:nvSpPr>
+          <p:cNvPr id="3" name="Content Placeholder 2"/>
+          <p:cNvSpPr>
+            <a:spLocks noGrp="1"/>
+          </p:cNvSpPr>
+          <p:nvPr>
+            <p:ph idx="1"/>
+          </p:nvPr>
+        </p:nvSpPr>
+        <p:spPr/>
+        <p:txBody>
+          <a:bodyPr/>
+          <a:lstStyle/>
+          <a:p>
+            <a:r>
+              <a:rPr lang="de-DE" smtClean="0"/>
+              <a:t>Why?</a:t>
+            </a:r>
+          </a:p>
+          <a:p>
+            <a:r>
+              <a:rPr lang="de-DE" smtClean="0"/>
+              <a:t>What, precisely?</a:t>
+            </a:r>
+          </a:p>
+          <a:p>
+            <a:r>
+              <a:rPr lang="de-DE" smtClean="0"/>
+              <a:t>How?</a:t>
+            </a:r>
+            <a:endParaRPr lang="de-DE"/>
+          </a:p>
+        </p:txBody>
+      </p:sp>
+      <p:sp>
+        <p:nvSpPr>
+          <p:cNvPr id="4" name="Date Placeholder 3"/>
+          <p:cNvSpPr>
+            <a:spLocks noGrp="1"/>
+          </p:cNvSpPr>
+          <p:nvPr>
+            <p:ph type="dt" sz="half" idx="10"/>
+          </p:nvPr>
+        </p:nvSpPr>
+        <p:spPr/>
+        <p:txBody>
+          <a:bodyPr/>
+          <a:lstStyle/>
+          <a:p>
+            <a:pPr>
+              <a:defRPr/>
+            </a:pPr>
+            <a:r>
+              <a:rPr lang="de-DE" altLang="de-DE" smtClean="0"/>
+              <a:t>2020-02-15</a:t>
+            </a:r>
+            <a:endParaRPr lang="de-DE" altLang="en-US"/>
+          </a:p>
+        </p:txBody>
+      </p:sp>
+      <p:sp>
+        <p:nvSpPr>
+          <p:cNvPr id="5" name="Footer Placeholder 4"/>
+          <p:cNvSpPr>
+            <a:spLocks noGrp="1"/>
+          </p:cNvSpPr>
+          <p:nvPr>
+            <p:ph type="ftr" sz="quarter" idx="11"/>
+          </p:nvPr>
+        </p:nvSpPr>
+        <p:spPr/>
+        <p:txBody>
+          <a:bodyPr/>
+          <a:lstStyle/>
+          <a:p>
+            <a:pPr>
+              <a:defRPr/>
+            </a:pPr>
+            <a:r>
+              <a:rPr lang="de-DE" altLang="en-US" smtClean="0"/>
+              <a:t>Greenfox</a:t>
+            </a:r>
+            <a:endParaRPr lang="de-DE" altLang="en-US"/>
+          </a:p>
+        </p:txBody>
+      </p:sp>
+      <p:sp>
+        <p:nvSpPr>
+          <p:cNvPr id="6" name="Slide Number Placeholder 5"/>
+          <p:cNvSpPr>
+            <a:spLocks noGrp="1"/>
+          </p:cNvSpPr>
+          <p:nvPr>
+            <p:ph type="sldNum" sz="quarter" idx="12"/>
+          </p:nvPr>
+        </p:nvSpPr>
+        <p:spPr/>
+        <p:txBody>
+          <a:bodyPr/>
+          <a:lstStyle/>
+          <a:p>
+            <a:pPr>
+              <a:defRPr/>
+            </a:pPr>
+            <a:fld id="{F031B2F4-27D1-4E53-97CF-1947CD75B185}" type="slidenum">
+              <a:rPr lang="de-DE" altLang="en-US" smtClean="0"/>
+              <a:pPr>
+                <a:defRPr/>
+              </a:pPr>
+              <a:t>3</a:t>
+            </a:fld>
+            <a:endParaRPr lang="de-DE" altLang="en-US"/>
+          </a:p>
+        </p:txBody>
+      </p:sp>
+    </p:spTree>
+    <p:extLst>
+      <p:ext uri="{BB962C8B-B14F-4D97-AF65-F5344CB8AC3E}">
+        <p14:creationId xmlns:p14="http://schemas.microsoft.com/office/powerpoint/2010/main" val="2000271398"/>
+      </p:ext>
+    </p:extLst>
+  </p:cSld>
+  <p:clrMapOvr>
+    <a:masterClrMapping/>
+  </p:clrMapOvr>
+  <p:timing>
+    <p:tnLst>
+      <p:par>
+        <p:cTn id="1" dur="indefinite" restart="never" nodeType="tmRoot"/>
+      </p:par>
+    </p:tnLst>
+  </p:timing>
+</p:sld>
+</file>
+
+<file path=ppt/slides/slide30.xml><?xml version="1.0" encoding="utf-8"?>
+<p:sld xmlns:a="http://schemas.openxmlformats.org/drawingml/2006/main" xmlns:r="http://schemas.openxmlformats.org/officeDocument/2006/relationships" xmlns:p="http://schemas.openxmlformats.org/presentationml/2006/main">
+  <p:cSld>
+    <p:spTree>
+      <p:nvGrpSpPr>
+        <p:cNvPr id="1" name=""/>
+        <p:cNvGrpSpPr/>
+        <p:nvPr/>
+      </p:nvGrpSpPr>
+      <p:grpSpPr>
+        <a:xfrm>
+          <a:off x="0" y="0"/>
+          <a:ext cx="0" cy="0"/>
+          <a:chOff x="0" y="0"/>
+          <a:chExt cx="0" cy="0"/>
+        </a:xfrm>
+      </p:grpSpPr>
+      <p:sp>
+        <p:nvSpPr>
+          <p:cNvPr id="2" name="Title 1"/>
+          <p:cNvSpPr>
+            <a:spLocks noGrp="1"/>
+          </p:cNvSpPr>
+          <p:nvPr>
+            <p:ph type="title"/>
+          </p:nvPr>
+        </p:nvSpPr>
+        <p:spPr/>
+        <p:txBody>
+          <a:bodyPr/>
+          <a:lstStyle/>
+          <a:p>
+            <a:r>
+              <a:rPr lang="de-DE" smtClean="0"/>
+              <a:t>+</a:t>
+            </a:r>
+            <a:endParaRPr lang="de-DE"/>
+          </a:p>
+        </p:txBody>
+      </p:sp>
+      <p:sp>
+        <p:nvSpPr>
+          <p:cNvPr id="3" name="Content Placeholder 2"/>
+          <p:cNvSpPr>
+            <a:spLocks noGrp="1"/>
+          </p:cNvSpPr>
+          <p:nvPr>
+            <p:ph idx="1"/>
+          </p:nvPr>
+        </p:nvSpPr>
+        <p:spPr/>
+        <p:txBody>
+          <a:bodyPr/>
+          <a:lstStyle/>
+          <a:p>
+            <a:endParaRPr lang="de-DE"/>
+          </a:p>
+        </p:txBody>
+      </p:sp>
+      <p:sp>
+        <p:nvSpPr>
+          <p:cNvPr id="4" name="Date Placeholder 3"/>
+          <p:cNvSpPr>
+            <a:spLocks noGrp="1"/>
+          </p:cNvSpPr>
+          <p:nvPr>
+            <p:ph type="dt" sz="half" idx="10"/>
+          </p:nvPr>
+        </p:nvSpPr>
+        <p:spPr/>
+        <p:txBody>
+          <a:bodyPr/>
+          <a:lstStyle/>
+          <a:p>
+            <a:pPr>
+              <a:defRPr/>
+            </a:pPr>
+            <a:r>
+              <a:rPr lang="de-DE" altLang="de-DE" smtClean="0"/>
+              <a:t>2020-02-15</a:t>
+            </a:r>
+            <a:endParaRPr lang="de-DE" altLang="en-US"/>
+          </a:p>
+        </p:txBody>
+      </p:sp>
+      <p:sp>
+        <p:nvSpPr>
+          <p:cNvPr id="5" name="Footer Placeholder 4"/>
+          <p:cNvSpPr>
+            <a:spLocks noGrp="1"/>
+          </p:cNvSpPr>
+          <p:nvPr>
+            <p:ph type="ftr" sz="quarter" idx="11"/>
+          </p:nvPr>
+        </p:nvSpPr>
+        <p:spPr/>
+        <p:txBody>
+          <a:bodyPr/>
+          <a:lstStyle/>
+          <a:p>
+            <a:pPr>
+              <a:defRPr/>
+            </a:pPr>
+            <a:r>
+              <a:rPr lang="de-DE" altLang="en-US" smtClean="0"/>
+              <a:t>Greenfox</a:t>
+            </a:r>
+            <a:endParaRPr lang="de-DE" altLang="en-US"/>
+          </a:p>
+        </p:txBody>
+      </p:sp>
+      <p:sp>
+        <p:nvSpPr>
+          <p:cNvPr id="6" name="Slide Number Placeholder 5"/>
+          <p:cNvSpPr>
+            <a:spLocks noGrp="1"/>
+          </p:cNvSpPr>
+          <p:nvPr>
+            <p:ph type="sldNum" sz="quarter" idx="12"/>
+          </p:nvPr>
+        </p:nvSpPr>
+        <p:spPr/>
+        <p:txBody>
+          <a:bodyPr/>
+          <a:lstStyle/>
+          <a:p>
+            <a:pPr>
+              <a:defRPr/>
+            </a:pPr>
+            <a:fld id="{F031B2F4-27D1-4E53-97CF-1947CD75B185}" type="slidenum">
+              <a:rPr lang="de-DE" altLang="en-US" smtClean="0"/>
+              <a:pPr>
+                <a:defRPr/>
+              </a:pPr>
+              <a:t>30</a:t>
+            </a:fld>
+            <a:endParaRPr lang="de-DE" altLang="en-US"/>
+          </a:p>
+        </p:txBody>
+      </p:sp>
+      <p:sp>
+        <p:nvSpPr>
+          <p:cNvPr id="7" name="TextBox 6"/>
+          <p:cNvSpPr txBox="1"/>
+          <p:nvPr/>
+        </p:nvSpPr>
+        <p:spPr>
+          <a:xfrm>
+            <a:off x="3450622" y="3356992"/>
+            <a:ext cx="2345514" cy="584775"/>
+          </a:xfrm>
+          <a:prstGeom prst="rect">
+            <a:avLst/>
+          </a:prstGeom>
+          <a:noFill/>
+        </p:spPr>
+        <p:txBody>
+          <a:bodyPr wrap="none" rtlCol="0">
+            <a:spAutoFit/>
+          </a:bodyPr>
+          <a:lstStyle/>
+          <a:p>
+            <a:r>
+              <a:rPr lang="de-DE" sz="3200" smtClean="0">
+                <a:solidFill>
+                  <a:srgbClr val="006600"/>
+                </a:solidFill>
+              </a:rPr>
+              <a:t>Thank you.</a:t>
+            </a:r>
+            <a:endParaRPr lang="de-DE" sz="3200">
+              <a:solidFill>
+                <a:srgbClr val="006600"/>
+              </a:solidFill>
+            </a:endParaRPr>
+          </a:p>
+        </p:txBody>
+      </p:sp>
+    </p:spTree>
+    <p:extLst>
+      <p:ext uri="{BB962C8B-B14F-4D97-AF65-F5344CB8AC3E}">
+        <p14:creationId xmlns:p14="http://schemas.microsoft.com/office/powerpoint/2010/main" val="1157495545"/>
+      </p:ext>
+    </p:extLst>
+  </p:cSld>
+  <p:clrMapOvr>
+    <a:masterClrMapping/>
+  </p:clrMapOvr>
+  <p:timing>
+    <p:tnLst>
+      <p:par>
+        <p:cTn id="1" dur="indefinite" restart="never" nodeType="tmRoot"/>
+      </p:par>
+    </p:tnLst>
+  </p:timing>
+</p:sld>
+</file>
+
+<file path=ppt/slides/slide31.xml><?xml version="1.0" encoding="utf-8"?>
+<p:sld xmlns:a="http://schemas.openxmlformats.org/drawingml/2006/main" xmlns:r="http://schemas.openxmlformats.org/officeDocument/2006/relationships" xmlns:p="http://schemas.openxmlformats.org/presentationml/2006/main">
+  <p:cSld>
+    <p:spTree>
+      <p:nvGrpSpPr>
+        <p:cNvPr id="1" name=""/>
+        <p:cNvGrpSpPr/>
+        <p:nvPr/>
+      </p:nvGrpSpPr>
+      <p:grpSpPr>
+        <a:xfrm>
+          <a:off x="0" y="0"/>
+          <a:ext cx="0" cy="0"/>
+          <a:chOff x="0" y="0"/>
+          <a:chExt cx="0" cy="0"/>
+        </a:xfrm>
+      </p:grpSpPr>
+      <p:sp>
+        <p:nvSpPr>
+          <p:cNvPr id="2" name="Title 1"/>
+          <p:cNvSpPr>
+            <a:spLocks noGrp="1"/>
+          </p:cNvSpPr>
+          <p:nvPr>
+            <p:ph type="title"/>
+          </p:nvPr>
+        </p:nvSpPr>
+        <p:spPr/>
+        <p:txBody>
+          <a:bodyPr/>
+          <a:lstStyle/>
+          <a:p>
+            <a:r>
+              <a:rPr lang="de-DE" smtClean="0"/>
+              <a:t>Cross-boundary navigation</a:t>
+            </a:r>
+            <a:endParaRPr lang="de-DE"/>
+          </a:p>
+        </p:txBody>
+      </p:sp>
+      <p:sp>
+        <p:nvSpPr>
+          <p:cNvPr id="4" name="Date Placeholder 3"/>
+          <p:cNvSpPr>
+            <a:spLocks noGrp="1"/>
+          </p:cNvSpPr>
+          <p:nvPr>
+            <p:ph type="dt" sz="half" idx="10"/>
+          </p:nvPr>
+        </p:nvSpPr>
+        <p:spPr/>
+        <p:txBody>
+          <a:bodyPr/>
+          <a:lstStyle/>
+          <a:p>
+            <a:pPr>
+              <a:defRPr/>
+            </a:pPr>
+            <a:r>
+              <a:rPr lang="de-DE" altLang="de-DE" smtClean="0"/>
+              <a:t>2020-02-15</a:t>
+            </a:r>
+            <a:endParaRPr lang="de-DE" altLang="en-US"/>
+          </a:p>
+        </p:txBody>
+      </p:sp>
+      <p:sp>
+        <p:nvSpPr>
+          <p:cNvPr id="5" name="Footer Placeholder 4"/>
+          <p:cNvSpPr>
+            <a:spLocks noGrp="1"/>
+          </p:cNvSpPr>
+          <p:nvPr>
+            <p:ph type="ftr" sz="quarter" idx="11"/>
+          </p:nvPr>
+        </p:nvSpPr>
+        <p:spPr/>
+        <p:txBody>
+          <a:bodyPr/>
+          <a:lstStyle/>
+          <a:p>
+            <a:pPr>
+              <a:defRPr/>
+            </a:pPr>
+            <a:r>
+              <a:rPr lang="de-DE" altLang="en-US" smtClean="0"/>
+              <a:t>Greenfox</a:t>
+            </a:r>
+            <a:endParaRPr lang="de-DE" altLang="en-US"/>
+          </a:p>
+        </p:txBody>
+      </p:sp>
+      <p:sp>
+        <p:nvSpPr>
+          <p:cNvPr id="6" name="Slide Number Placeholder 5"/>
+          <p:cNvSpPr>
+            <a:spLocks noGrp="1"/>
+          </p:cNvSpPr>
+          <p:nvPr>
+            <p:ph type="sldNum" sz="quarter" idx="12"/>
+          </p:nvPr>
+        </p:nvSpPr>
+        <p:spPr/>
+        <p:txBody>
+          <a:bodyPr/>
+          <a:lstStyle/>
+          <a:p>
+            <a:pPr>
+              <a:defRPr/>
+            </a:pPr>
+            <a:fld id="{F031B2F4-27D1-4E53-97CF-1947CD75B185}" type="slidenum">
+              <a:rPr lang="de-DE" altLang="en-US" smtClean="0"/>
+              <a:pPr>
+                <a:defRPr/>
+              </a:pPr>
+              <a:t>31</a:t>
             </a:fld>
             <a:endParaRPr lang="de-DE" altLang="en-US"/>
           </a:p>
@@ -30847,7 +31300,7 @@
 </p:sld>
 </file>
 
-<file path=ppt/slides/slide3.xml><?xml version="1.0" encoding="utf-8"?>
+<file path=ppt/slides/slide32.xml><?xml version="1.0" encoding="utf-8"?>
 <p:sld xmlns:a="http://schemas.openxmlformats.org/drawingml/2006/main" xmlns:r="http://schemas.openxmlformats.org/officeDocument/2006/relationships" xmlns:p="http://schemas.openxmlformats.org/presentationml/2006/main">
   <p:cSld>
     <p:spTree>
@@ -30881,44 +31334,24 @@
           <a:p>
             <a:r>
               <a:rPr lang="de-DE" smtClean="0"/>
-              <a:t>File system validation</a:t>
-            </a:r>
-            <a:endParaRPr lang="de-DE"/>
-          </a:p>
-        </p:txBody>
-      </p:sp>
-      <p:sp>
-        <p:nvSpPr>
-          <p:cNvPr id="3" name="Content Placeholder 2"/>
-          <p:cNvSpPr>
-            <a:spLocks noGrp="1"/>
-          </p:cNvSpPr>
-          <p:nvPr>
-            <p:ph idx="1"/>
-          </p:nvPr>
-        </p:nvSpPr>
-        <p:spPr/>
-        <p:txBody>
-          <a:bodyPr/>
-          <a:lstStyle/>
-          <a:p>
-            <a:r>
+              <a:t>Target declarations</a:t>
+            </a:r>
+            <a:br>
               <a:rPr lang="de-DE" smtClean="0"/>
-              <a:t>Why?</a:t>
-            </a:r>
-          </a:p>
-          <a:p>
+            </a:br>
+            <a:r>
+              <a:rPr lang="de-DE"/>
+              <a:t> </a:t>
+            </a:r>
             <a:r>
               <a:rPr lang="de-DE" smtClean="0"/>
-              <a:t>What, precisely?</a:t>
-            </a:r>
-          </a:p>
-          <a:p>
-            <a:r>
-              <a:rPr lang="de-DE" smtClean="0"/>
-              <a:t>How?</a:t>
-            </a:r>
-            <a:endParaRPr lang="de-DE"/>
+              <a:t>  (</a:t>
+            </a:r>
+            <a:r>
+              <a:rPr lang="de-DE" i="1" smtClean="0"/>
+              <a:t>foxpath expressions)</a:t>
+            </a:r>
+            <a:endParaRPr lang="de-DE" i="1"/>
           </a:p>
         </p:txBody>
       </p:sp>
@@ -30997,16 +31430,370 @@
               <a:pPr>
                 <a:defRPr/>
               </a:pPr>
-              <a:t>3</a:t>
+              <a:t>32</a:t>
             </a:fld>
             <a:endParaRPr lang="de-DE" altLang="en-US"/>
           </a:p>
         </p:txBody>
       </p:sp>
+      <p:graphicFrame>
+        <p:nvGraphicFramePr>
+          <p:cNvPr id="8" name="Table 7"/>
+          <p:cNvGraphicFramePr>
+            <a:graphicFrameLocks noGrp="1"/>
+          </p:cNvGraphicFramePr>
+          <p:nvPr>
+            <p:extLst>
+              <p:ext uri="{D42A27DB-BD31-4B8C-83A1-F6EECF244321}">
+                <p14:modId xmlns:p14="http://schemas.microsoft.com/office/powerpoint/2010/main" val="3727182175"/>
+              </p:ext>
+            </p:extLst>
+          </p:nvPr>
+        </p:nvGraphicFramePr>
+        <p:xfrm>
+          <a:off x="35496" y="2052424"/>
+          <a:ext cx="9073008" cy="3307080"/>
+        </p:xfrm>
+        <a:graphic>
+          <a:graphicData uri="http://schemas.openxmlformats.org/drawingml/2006/table">
+            <a:tbl>
+              <a:tblPr firstRow="1" bandRow="1">
+                <a:tableStyleId>{5C22544A-7EE6-4342-B048-85BDC9FD1C3A}</a:tableStyleId>
+              </a:tblPr>
+              <a:tblGrid>
+                <a:gridCol w="4608512"/>
+                <a:gridCol w="4464496"/>
+              </a:tblGrid>
+              <a:tr h="370840">
+                <a:tc>
+                  <a:txBody>
+                    <a:bodyPr/>
+                    <a:lstStyle/>
+                    <a:p>
+                      <a:r>
+                        <a:rPr lang="de-DE" smtClean="0"/>
+                        <a:t>Target declaration</a:t>
+                      </a:r>
+                      <a:endParaRPr lang="de-DE"/>
+                    </a:p>
+                  </a:txBody>
+                  <a:tcPr>
+                    <a:solidFill>
+                      <a:srgbClr val="006600"/>
+                    </a:solidFill>
+                  </a:tcPr>
+                </a:tc>
+                <a:tc>
+                  <a:txBody>
+                    <a:bodyPr/>
+                    <a:lstStyle/>
+                    <a:p>
+                      <a:r>
+                        <a:rPr lang="de-DE" smtClean="0"/>
+                        <a:t>Selection</a:t>
+                      </a:r>
+                      <a:endParaRPr lang="de-DE"/>
+                    </a:p>
+                  </a:txBody>
+                  <a:tcPr>
+                    <a:solidFill>
+                      <a:srgbClr val="006600"/>
+                    </a:solidFill>
+                  </a:tcPr>
+                </a:tc>
+              </a:tr>
+              <a:tr h="370840">
+                <a:tc>
+                  <a:txBody>
+                    <a:bodyPr/>
+                    <a:lstStyle/>
+                    <a:p>
+                      <a:r>
+                        <a:rPr lang="de-DE" smtClean="0">
+                          <a:latin typeface="Courier New" panose="02070309020205020404" pitchFamily="49" charset="0"/>
+                          <a:cs typeface="Courier New" panose="02070309020205020404" pitchFamily="49" charset="0"/>
+                        </a:rPr>
+                        <a:t>catalog.xml</a:t>
+                      </a:r>
+                      <a:endParaRPr lang="de-DE">
+                        <a:latin typeface="Courier New" panose="02070309020205020404" pitchFamily="49" charset="0"/>
+                        <a:cs typeface="Courier New" panose="02070309020205020404" pitchFamily="49" charset="0"/>
+                      </a:endParaRPr>
+                    </a:p>
+                  </a:txBody>
+                  <a:tcPr/>
+                </a:tc>
+                <a:tc>
+                  <a:txBody>
+                    <a:bodyPr/>
+                    <a:lstStyle/>
+                    <a:p>
+                      <a:r>
+                        <a:rPr lang="de-DE" smtClean="0"/>
+                        <a:t>The catalog.xml file</a:t>
+                      </a:r>
+                      <a:r>
+                        <a:rPr lang="de-DE" baseline="0" smtClean="0"/>
+                        <a:t> </a:t>
+                      </a:r>
+                      <a:r>
+                        <a:rPr lang="de-DE" i="1" baseline="0" smtClean="0"/>
+                        <a:t>in</a:t>
+                      </a:r>
+                      <a:r>
+                        <a:rPr lang="de-DE" baseline="0" smtClean="0"/>
+                        <a:t> the current folder</a:t>
+                      </a:r>
+                      <a:endParaRPr lang="de-DE"/>
+                    </a:p>
+                  </a:txBody>
+                  <a:tcPr/>
+                </a:tc>
+              </a:tr>
+              <a:tr h="370840">
+                <a:tc>
+                  <a:txBody>
+                    <a:bodyPr/>
+                    <a:lstStyle/>
+                    <a:p>
+                      <a:r>
+                        <a:rPr lang="de-DE" smtClean="0">
+                          <a:latin typeface="Courier New" panose="02070309020205020404" pitchFamily="49" charset="0"/>
+                          <a:cs typeface="Courier New" panose="02070309020205020404" pitchFamily="49" charset="0"/>
+                        </a:rPr>
+                        <a:t>.\\catalog.xml</a:t>
+                      </a:r>
+                      <a:endParaRPr lang="de-DE">
+                        <a:latin typeface="Courier New" panose="02070309020205020404" pitchFamily="49" charset="0"/>
+                        <a:cs typeface="Courier New" panose="02070309020205020404" pitchFamily="49" charset="0"/>
+                      </a:endParaRPr>
+                    </a:p>
+                  </a:txBody>
+                  <a:tcPr/>
+                </a:tc>
+                <a:tc>
+                  <a:txBody>
+                    <a:bodyPr/>
+                    <a:lstStyle/>
+                    <a:p>
+                      <a:r>
+                        <a:rPr lang="de-DE" smtClean="0"/>
+                        <a:t>catalog.xml files </a:t>
+                      </a:r>
+                      <a:r>
+                        <a:rPr lang="de-DE" i="1" smtClean="0"/>
+                        <a:t>under</a:t>
+                      </a:r>
+                      <a:r>
+                        <a:rPr lang="de-DE" smtClean="0"/>
+                        <a:t> the current folder</a:t>
+                      </a:r>
+                      <a:endParaRPr lang="de-DE"/>
+                    </a:p>
+                  </a:txBody>
+                  <a:tcPr/>
+                </a:tc>
+              </a:tr>
+              <a:tr h="370840">
+                <a:tc>
+                  <a:txBody>
+                    <a:bodyPr/>
+                    <a:lstStyle/>
+                    <a:p>
+                      <a:r>
+                        <a:rPr lang="de-DE" smtClean="0">
+                          <a:latin typeface="Courier New" panose="02070309020205020404" pitchFamily="49" charset="0"/>
+                          <a:cs typeface="Courier New" panose="02070309020205020404" pitchFamily="49" charset="0"/>
+                        </a:rPr>
+                        <a:t>..\projects\\catalog.xml</a:t>
+                      </a:r>
+                      <a:endParaRPr lang="de-DE">
+                        <a:latin typeface="Courier New" panose="02070309020205020404" pitchFamily="49" charset="0"/>
+                        <a:cs typeface="Courier New" panose="02070309020205020404" pitchFamily="49" charset="0"/>
+                      </a:endParaRPr>
+                    </a:p>
+                  </a:txBody>
+                  <a:tcPr/>
+                </a:tc>
+                <a:tc>
+                  <a:txBody>
+                    <a:bodyPr/>
+                    <a:lstStyle/>
+                    <a:p>
+                      <a:r>
+                        <a:rPr lang="de-DE" smtClean="0"/>
+                        <a:t>All catalog.xml files in or</a:t>
+                      </a:r>
+                      <a:r>
+                        <a:rPr lang="de-DE" baseline="0" smtClean="0"/>
+                        <a:t> under the </a:t>
+                      </a:r>
+                      <a:r>
+                        <a:rPr lang="de-DE" baseline="0" smtClean="0">
+                          <a:latin typeface="Courier New" panose="02070309020205020404" pitchFamily="49" charset="0"/>
+                          <a:cs typeface="Courier New" panose="02070309020205020404" pitchFamily="49" charset="0"/>
+                        </a:rPr>
+                        <a:t>projects</a:t>
+                      </a:r>
+                      <a:r>
+                        <a:rPr lang="de-DE" baseline="0" smtClean="0"/>
+                        <a:t> sibling of the current folder</a:t>
+                      </a:r>
+                      <a:endParaRPr lang="de-DE"/>
+                    </a:p>
+                  </a:txBody>
+                  <a:tcPr/>
+                </a:tc>
+              </a:tr>
+              <a:tr h="370840">
+                <a:tc>
+                  <a:txBody>
+                    <a:bodyPr/>
+                    <a:lstStyle/>
+                    <a:p>
+                      <a:pPr marL="0" marR="0" lvl="0" indent="0" algn="l" defTabSz="914400" rtl="0" eaLnBrk="1" fontAlgn="auto" latinLnBrk="0" hangingPunct="1">
+                        <a:lnSpc>
+                          <a:spcPct val="100000"/>
+                        </a:lnSpc>
+                        <a:spcBef>
+                          <a:spcPts val="0"/>
+                        </a:spcBef>
+                        <a:spcAft>
+                          <a:spcPts val="0"/>
+                        </a:spcAft>
+                        <a:buClrTx/>
+                        <a:buSzTx/>
+                        <a:buFontTx/>
+                        <a:buNone/>
+                        <a:tabLst/>
+                        <a:defRPr/>
+                      </a:pPr>
+                      <a:r>
+                        <a:rPr lang="de-DE" smtClean="0">
+                          <a:latin typeface="Courier New" panose="02070309020205020404" pitchFamily="49" charset="0"/>
+                          <a:cs typeface="Courier New" panose="02070309020205020404" pitchFamily="49" charset="0"/>
+                        </a:rPr>
+                        <a:t>..\projects\\catalog.xml</a:t>
+                      </a:r>
+                    </a:p>
+                    <a:p>
+                      <a:r>
+                        <a:rPr lang="de-DE" smtClean="0">
+                          <a:latin typeface="Courier New" panose="02070309020205020404" pitchFamily="49" charset="0"/>
+                          <a:cs typeface="Courier New" panose="02070309020205020404" pitchFamily="49" charset="0"/>
+                        </a:rPr>
+                        <a:t>    [parent~::xsd]</a:t>
+                      </a:r>
+                      <a:endParaRPr lang="de-DE">
+                        <a:latin typeface="Courier New" panose="02070309020205020404" pitchFamily="49" charset="0"/>
+                        <a:cs typeface="Courier New" panose="02070309020205020404" pitchFamily="49" charset="0"/>
+                      </a:endParaRPr>
+                    </a:p>
+                  </a:txBody>
+                  <a:tcPr/>
+                </a:tc>
+                <a:tc>
+                  <a:txBody>
+                    <a:bodyPr/>
+                    <a:lstStyle/>
+                    <a:p>
+                      <a:r>
+                        <a:rPr lang="de-DE" smtClean="0"/>
+                        <a:t>As before, but filtering</a:t>
+                      </a:r>
+                      <a:r>
+                        <a:rPr lang="de-DE" baseline="0" smtClean="0"/>
+                        <a:t> by name of containing folder</a:t>
+                      </a:r>
+                      <a:endParaRPr lang="de-DE"/>
+                    </a:p>
+                  </a:txBody>
+                  <a:tcPr/>
+                </a:tc>
+              </a:tr>
+              <a:tr h="370840">
+                <a:tc>
+                  <a:txBody>
+                    <a:bodyPr/>
+                    <a:lstStyle/>
+                    <a:p>
+                      <a:r>
+                        <a:rPr lang="de-DE" smtClean="0">
+                          <a:latin typeface="Courier New" panose="02070309020205020404" pitchFamily="49" charset="0"/>
+                          <a:cs typeface="Courier New" panose="02070309020205020404" pitchFamily="49" charset="0"/>
+                        </a:rPr>
+                        <a:t>..\projects\\catalog.xml</a:t>
+                      </a:r>
+                    </a:p>
+                    <a:p>
+                      <a:pPr marL="0" marR="0" lvl="0" indent="0" algn="l" defTabSz="914400" rtl="0" eaLnBrk="1" fontAlgn="auto" latinLnBrk="0" hangingPunct="1">
+                        <a:lnSpc>
+                          <a:spcPct val="100000"/>
+                        </a:lnSpc>
+                        <a:spcBef>
+                          <a:spcPts val="0"/>
+                        </a:spcBef>
+                        <a:spcAft>
+                          <a:spcPts val="0"/>
+                        </a:spcAft>
+                        <a:buClrTx/>
+                        <a:buSzTx/>
+                        <a:buFontTx/>
+                        <a:buNone/>
+                        <a:tabLst/>
+                        <a:defRPr/>
+                      </a:pPr>
+                      <a:r>
+                        <a:rPr lang="de-DE" smtClean="0">
+                          <a:latin typeface="Courier New" panose="02070309020205020404" pitchFamily="49" charset="0"/>
+                          <a:cs typeface="Courier New" panose="02070309020205020404" pitchFamily="49" charset="0"/>
+                        </a:rPr>
+                        <a:t>    [parent~::xsd]</a:t>
+                      </a:r>
+                    </a:p>
+                    <a:p>
+                      <a:r>
+                        <a:rPr lang="de-DE" smtClean="0">
+                          <a:latin typeface="Courier New" panose="02070309020205020404" pitchFamily="49" charset="0"/>
+                          <a:cs typeface="Courier New" panose="02070309020205020404" pitchFamily="49" charset="0"/>
+                        </a:rPr>
+                        <a:t>    [//@rewritePrefix]</a:t>
+                      </a:r>
+                      <a:endParaRPr lang="de-DE">
+                        <a:latin typeface="Courier New" panose="02070309020205020404" pitchFamily="49" charset="0"/>
+                        <a:cs typeface="Courier New" panose="02070309020205020404" pitchFamily="49" charset="0"/>
+                      </a:endParaRPr>
+                    </a:p>
+                  </a:txBody>
+                  <a:tcPr/>
+                </a:tc>
+                <a:tc>
+                  <a:txBody>
+                    <a:bodyPr/>
+                    <a:lstStyle/>
+                    <a:p>
+                      <a:r>
+                        <a:rPr lang="de-DE" smtClean="0"/>
+                        <a:t>As before, but</a:t>
+                      </a:r>
+                      <a:r>
+                        <a:rPr lang="de-DE" baseline="0" smtClean="0"/>
+                        <a:t> filtering also by file content</a:t>
+                      </a:r>
+                      <a:endParaRPr lang="de-DE"/>
+                    </a:p>
+                  </a:txBody>
+                  <a:tcPr/>
+                </a:tc>
+              </a:tr>
+            </a:tbl>
+          </a:graphicData>
+        </a:graphic>
+      </p:graphicFrame>
     </p:spTree>
     <p:extLst>
       <p:ext uri="{BB962C8B-B14F-4D97-AF65-F5344CB8AC3E}">
-        <p14:creationId xmlns:p14="http://schemas.microsoft.com/office/powerpoint/2010/main" val="2000271398"/>
+        <p14:creationId xmlns:p14="http://schemas.microsoft.com/office/powerpoint/2010/main" val="210222838"/>
       </p:ext>
     </p:extLst>
   </p:cSld>

</xml_diff>